<commit_message>
Added some more stuff
</commit_message>
<xml_diff>
--- a/Presentation_1.pptx
+++ b/Presentation_1.pptx
@@ -244,7 +244,7 @@
           <a:p>
             <a:fld id="{776C8E78-E43C-423C-8F84-C588C40EE856}" type="datetimeFigureOut">
               <a:rPr lang="en-US" smtClean="0"/>
-              <a:t>23-Nov-20</a:t>
+              <a:t>24-Nov-20</a:t>
             </a:fld>
             <a:endParaRPr lang="en-US"/>
           </a:p>
@@ -931,7 +931,7 @@
           <a:p>
             <a:fld id="{997E3D89-5AC1-4E29-8B79-6F7A6C159ABA}" type="datetimeFigureOut">
               <a:rPr lang="en-US" smtClean="0"/>
-              <a:t>23-Nov-20</a:t>
+              <a:t>24-Nov-20</a:t>
             </a:fld>
             <a:endParaRPr lang="en-US"/>
           </a:p>
@@ -1159,7 +1159,7 @@
           <a:p>
             <a:fld id="{997E3D89-5AC1-4E29-8B79-6F7A6C159ABA}" type="datetimeFigureOut">
               <a:rPr lang="en-US" smtClean="0"/>
-              <a:t>23-Nov-20</a:t>
+              <a:t>24-Nov-20</a:t>
             </a:fld>
             <a:endParaRPr lang="en-US"/>
           </a:p>
@@ -1339,7 +1339,7 @@
           <a:p>
             <a:fld id="{997E3D89-5AC1-4E29-8B79-6F7A6C159ABA}" type="datetimeFigureOut">
               <a:rPr lang="en-US" smtClean="0"/>
-              <a:t>23-Nov-20</a:t>
+              <a:t>24-Nov-20</a:t>
             </a:fld>
             <a:endParaRPr lang="en-US"/>
           </a:p>
@@ -1509,7 +1509,7 @@
           <a:p>
             <a:fld id="{997E3D89-5AC1-4E29-8B79-6F7A6C159ABA}" type="datetimeFigureOut">
               <a:rPr lang="en-US" smtClean="0"/>
-              <a:t>23-Nov-20</a:t>
+              <a:t>24-Nov-20</a:t>
             </a:fld>
             <a:endParaRPr lang="en-US"/>
           </a:p>
@@ -1763,7 +1763,7 @@
           <a:p>
             <a:fld id="{997E3D89-5AC1-4E29-8B79-6F7A6C159ABA}" type="datetimeFigureOut">
               <a:rPr lang="en-US" smtClean="0"/>
-              <a:t>23-Nov-20</a:t>
+              <a:t>24-Nov-20</a:t>
             </a:fld>
             <a:endParaRPr lang="en-US"/>
           </a:p>
@@ -2089,7 +2089,7 @@
           <a:p>
             <a:fld id="{997E3D89-5AC1-4E29-8B79-6F7A6C159ABA}" type="datetimeFigureOut">
               <a:rPr lang="en-US" smtClean="0"/>
-              <a:t>23-Nov-20</a:t>
+              <a:t>24-Nov-20</a:t>
             </a:fld>
             <a:endParaRPr lang="en-US"/>
           </a:p>
@@ -2540,7 +2540,7 @@
           <a:p>
             <a:fld id="{997E3D89-5AC1-4E29-8B79-6F7A6C159ABA}" type="datetimeFigureOut">
               <a:rPr lang="en-US" smtClean="0"/>
-              <a:t>23-Nov-20</a:t>
+              <a:t>24-Nov-20</a:t>
             </a:fld>
             <a:endParaRPr lang="en-US"/>
           </a:p>
@@ -2658,7 +2658,7 @@
           <a:p>
             <a:fld id="{997E3D89-5AC1-4E29-8B79-6F7A6C159ABA}" type="datetimeFigureOut">
               <a:rPr lang="en-US" smtClean="0"/>
-              <a:t>23-Nov-20</a:t>
+              <a:t>24-Nov-20</a:t>
             </a:fld>
             <a:endParaRPr lang="en-US"/>
           </a:p>
@@ -2753,7 +2753,7 @@
           <a:p>
             <a:fld id="{997E3D89-5AC1-4E29-8B79-6F7A6C159ABA}" type="datetimeFigureOut">
               <a:rPr lang="en-US" smtClean="0"/>
-              <a:t>23-Nov-20</a:t>
+              <a:t>24-Nov-20</a:t>
             </a:fld>
             <a:endParaRPr lang="en-US"/>
           </a:p>
@@ -3040,7 +3040,7 @@
           <a:p>
             <a:fld id="{997E3D89-5AC1-4E29-8B79-6F7A6C159ABA}" type="datetimeFigureOut">
               <a:rPr lang="en-US" smtClean="0"/>
-              <a:t>23-Nov-20</a:t>
+              <a:t>24-Nov-20</a:t>
             </a:fld>
             <a:endParaRPr lang="en-US"/>
           </a:p>
@@ -3362,7 +3362,7 @@
           <a:p>
             <a:fld id="{997E3D89-5AC1-4E29-8B79-6F7A6C159ABA}" type="datetimeFigureOut">
               <a:rPr lang="en-US" smtClean="0"/>
-              <a:t>23-Nov-20</a:t>
+              <a:t>24-Nov-20</a:t>
             </a:fld>
             <a:endParaRPr lang="en-US"/>
           </a:p>
@@ -3616,7 +3616,7 @@
           <a:p>
             <a:fld id="{997E3D89-5AC1-4E29-8B79-6F7A6C159ABA}" type="datetimeFigureOut">
               <a:rPr lang="en-US" smtClean="0"/>
-              <a:t>23-Nov-20</a:t>
+              <a:t>24-Nov-20</a:t>
             </a:fld>
             <a:endParaRPr lang="en-US"/>
           </a:p>
@@ -4268,38 +4268,581 @@
           </a:p>
         </p:txBody>
       </p:sp>
-      <p:sp>
-        <p:nvSpPr>
-          <p:cNvPr id="3" name="Content Placeholder 2">
-            <a:extLst>
-              <a:ext uri="{FF2B5EF4-FFF2-40B4-BE49-F238E27FC236}">
-                <a16:creationId xmlns:a16="http://schemas.microsoft.com/office/drawing/2014/main" id="{18ED27A9-7C5A-4401-ACBD-37470CB7427E}"/>
-              </a:ext>
-            </a:extLst>
-          </p:cNvPr>
-          <p:cNvSpPr>
-            <a:spLocks noGrp="1"/>
-          </p:cNvSpPr>
-          <p:nvPr>
-            <p:ph idx="1"/>
-          </p:nvPr>
-        </p:nvSpPr>
-        <p:spPr>
-          <a:xfrm>
-            <a:off x="1261872" y="1828800"/>
-            <a:ext cx="8595360" cy="4351337"/>
-          </a:xfrm>
-        </p:spPr>
-        <p:txBody>
-          <a:bodyPr>
-            <a:normAutofit/>
-          </a:bodyPr>
-          <a:lstStyle/>
-          <a:p>
-            <a:endParaRPr lang="en-US" dirty="0"/>
-          </a:p>
-        </p:txBody>
-      </p:sp>
+      <mc:AlternateContent xmlns:mc="http://schemas.openxmlformats.org/markup-compatibility/2006">
+        <mc:Choice xmlns:a14="http://schemas.microsoft.com/office/drawing/2010/main" Requires="a14">
+          <p:sp>
+            <p:nvSpPr>
+              <p:cNvPr id="3" name="Content Placeholder 2">
+                <a:extLst>
+                  <a:ext uri="{FF2B5EF4-FFF2-40B4-BE49-F238E27FC236}">
+                    <a16:creationId xmlns:a16="http://schemas.microsoft.com/office/drawing/2014/main" id="{18ED27A9-7C5A-4401-ACBD-37470CB7427E}"/>
+                  </a:ext>
+                </a:extLst>
+              </p:cNvPr>
+              <p:cNvSpPr>
+                <a:spLocks noGrp="1"/>
+              </p:cNvSpPr>
+              <p:nvPr>
+                <p:ph idx="1"/>
+              </p:nvPr>
+            </p:nvSpPr>
+            <p:spPr>
+              <a:xfrm>
+                <a:off x="1261872" y="1828800"/>
+                <a:ext cx="8595360" cy="4351337"/>
+              </a:xfrm>
+            </p:spPr>
+            <p:txBody>
+              <a:bodyPr>
+                <a:normAutofit fontScale="92500" lnSpcReduction="10000"/>
+              </a:bodyPr>
+              <a:lstStyle/>
+              <a:p>
+                <a:r>
+                  <a:rPr lang="en-US" sz="2000" dirty="0"/>
+                  <a:t>When a cuckoo grows old enough to leave the nest, its first instinct is to migrate to a better habitat</a:t>
+                </a:r>
+              </a:p>
+              <a:p>
+                <a:r>
+                  <a:rPr lang="en-US" sz="2000" dirty="0"/>
+                  <a:t>Cuckoos are clustered into k habitats (k = 3 to 5) using a clustering algorithm (Rajabioun et al. suggest k-means)</a:t>
+                </a:r>
+              </a:p>
+              <a:p>
+                <a:r>
+                  <a:rPr lang="en-US" sz="2000" dirty="0"/>
+                  <a:t>The best cuckoo in the best habitat becomes the goal point towards which all other cuckoos migrate</a:t>
+                </a:r>
+              </a:p>
+              <a:p>
+                <a:r>
+                  <a:rPr lang="en-US" sz="2000" dirty="0"/>
+                  <a:t>Cuckoo migration method 1</a:t>
+                </a:r>
+              </a:p>
+              <a:p>
+                <a:pPr lvl="1"/>
+                <a:r>
+                  <a:rPr lang="en-US" sz="1800" dirty="0"/>
+                  <a:t>Cuckoo x migrates distance </a:t>
+                </a:r>
+                <a14:m>
+                  <m:oMath xmlns:m="http://schemas.openxmlformats.org/officeDocument/2006/math">
+                    <m:r>
+                      <a:rPr lang="en-US" sz="1800" b="0" i="1" smtClean="0">
+                        <a:latin typeface="Cambria Math" panose="02040503050406030204" pitchFamily="18" charset="0"/>
+                      </a:rPr>
+                      <m:t>𝜆</m:t>
+                    </m:r>
+                    <m:r>
+                      <a:rPr lang="en-US" sz="1800" b="0" i="1" smtClean="0">
+                        <a:latin typeface="Cambria Math" panose="02040503050406030204" pitchFamily="18" charset="0"/>
+                      </a:rPr>
+                      <m:t>𝑑</m:t>
+                    </m:r>
+                    <m:r>
+                      <a:rPr lang="en-US" sz="1800" b="0" i="1" smtClean="0">
+                        <a:latin typeface="Cambria Math" panose="02040503050406030204" pitchFamily="18" charset="0"/>
+                      </a:rPr>
+                      <m:t>(</m:t>
+                    </m:r>
+                    <m:r>
+                      <a:rPr lang="en-US" sz="1800" b="0" i="1" smtClean="0">
+                        <a:latin typeface="Cambria Math" panose="02040503050406030204" pitchFamily="18" charset="0"/>
+                      </a:rPr>
+                      <m:t>𝑥</m:t>
+                    </m:r>
+                    <m:r>
+                      <a:rPr lang="en-US" sz="1800" b="0" i="1" smtClean="0">
+                        <a:latin typeface="Cambria Math" panose="02040503050406030204" pitchFamily="18" charset="0"/>
+                      </a:rPr>
+                      <m:t>, </m:t>
+                    </m:r>
+                    <m:r>
+                      <a:rPr lang="en-US" sz="1800" b="0" i="1" smtClean="0">
+                        <a:latin typeface="Cambria Math" panose="02040503050406030204" pitchFamily="18" charset="0"/>
+                      </a:rPr>
+                      <m:t>𝑔𝑝</m:t>
+                    </m:r>
+                    <m:r>
+                      <a:rPr lang="en-US" sz="1800" b="0" i="1" smtClean="0">
+                        <a:latin typeface="Cambria Math" panose="02040503050406030204" pitchFamily="18" charset="0"/>
+                      </a:rPr>
+                      <m:t>)</m:t>
+                    </m:r>
+                  </m:oMath>
+                </a14:m>
+                <a:r>
+                  <a:rPr lang="en-US" sz="1800" dirty="0"/>
+                  <a:t> towards goal point </a:t>
+                </a:r>
+                <a:r>
+                  <a:rPr lang="en-US" sz="1800" dirty="0" err="1"/>
+                  <a:t>gp</a:t>
+                </a:r>
+                <a:r>
+                  <a:rPr lang="en-US" sz="1800" dirty="0"/>
+                  <a:t> with deviation </a:t>
+                </a:r>
+                <a14:m>
+                  <m:oMath xmlns:m="http://schemas.openxmlformats.org/officeDocument/2006/math">
+                    <m:r>
+                      <a:rPr lang="en-US" sz="1800" b="0" i="1" smtClean="0">
+                        <a:latin typeface="Cambria Math" panose="02040503050406030204" pitchFamily="18" charset="0"/>
+                      </a:rPr>
+                      <m:t>𝜙</m:t>
+                    </m:r>
+                  </m:oMath>
+                </a14:m>
+                <a:r>
+                  <a:rPr lang="en-US" sz="1800" dirty="0"/>
+                  <a:t> radians</a:t>
+                </a:r>
+              </a:p>
+              <a:p>
+                <a:pPr lvl="1"/>
+                <a14:m>
+                  <m:oMath xmlns:m="http://schemas.openxmlformats.org/officeDocument/2006/math">
+                    <m:r>
+                      <a:rPr lang="en-US" sz="1800" b="0" i="1" smtClean="0">
+                        <a:latin typeface="Cambria Math" panose="02040503050406030204" pitchFamily="18" charset="0"/>
+                      </a:rPr>
+                      <m:t>𝜆</m:t>
+                    </m:r>
+                    <m:r>
+                      <a:rPr lang="en-US" sz="1800" b="0" i="1" smtClean="0">
+                        <a:latin typeface="Cambria Math" panose="02040503050406030204" pitchFamily="18" charset="0"/>
+                      </a:rPr>
+                      <m:t> ~ </m:t>
+                    </m:r>
+                    <m:r>
+                      <a:rPr lang="en-US" sz="1800" b="0" i="1" smtClean="0">
+                        <a:latin typeface="Cambria Math" panose="02040503050406030204" pitchFamily="18" charset="0"/>
+                      </a:rPr>
+                      <m:t>𝑈</m:t>
+                    </m:r>
+                    <m:r>
+                      <a:rPr lang="en-US" sz="1800" b="0" i="1" smtClean="0">
+                        <a:latin typeface="Cambria Math" panose="02040503050406030204" pitchFamily="18" charset="0"/>
+                      </a:rPr>
+                      <m:t>(0, 1)</m:t>
+                    </m:r>
+                  </m:oMath>
+                </a14:m>
+                <a:r>
+                  <a:rPr lang="en-US" sz="1800" dirty="0"/>
+                  <a:t>	</a:t>
+                </a:r>
+                <a14:m>
+                  <m:oMath xmlns:m="http://schemas.openxmlformats.org/officeDocument/2006/math">
+                    <m:r>
+                      <a:rPr lang="en-US" sz="1800" b="0" i="1" smtClean="0">
+                        <a:latin typeface="Cambria Math" panose="02040503050406030204" pitchFamily="18" charset="0"/>
+                      </a:rPr>
+                      <m:t>𝜙</m:t>
+                    </m:r>
+                    <m:r>
+                      <a:rPr lang="en-US" sz="1800" b="0" i="1" smtClean="0">
+                        <a:latin typeface="Cambria Math" panose="02040503050406030204" pitchFamily="18" charset="0"/>
+                      </a:rPr>
+                      <m:t> ~ </m:t>
+                    </m:r>
+                    <m:r>
+                      <a:rPr lang="en-US" sz="1800" b="0" i="1" smtClean="0">
+                        <a:latin typeface="Cambria Math" panose="02040503050406030204" pitchFamily="18" charset="0"/>
+                      </a:rPr>
+                      <m:t>𝑈</m:t>
+                    </m:r>
+                    <m:d>
+                      <m:dPr>
+                        <m:ctrlPr>
+                          <a:rPr lang="en-US" sz="1800" b="0" i="1" smtClean="0">
+                            <a:latin typeface="Cambria Math" panose="02040503050406030204" pitchFamily="18" charset="0"/>
+                          </a:rPr>
+                        </m:ctrlPr>
+                      </m:dPr>
+                      <m:e>
+                        <m:r>
+                          <a:rPr lang="en-US" sz="1800" b="0" i="1" smtClean="0">
+                            <a:latin typeface="Cambria Math" panose="02040503050406030204" pitchFamily="18" charset="0"/>
+                          </a:rPr>
+                          <m:t>−</m:t>
+                        </m:r>
+                        <m:r>
+                          <a:rPr lang="en-US" sz="1800" b="0" i="1" smtClean="0">
+                            <a:latin typeface="Cambria Math" panose="02040503050406030204" pitchFamily="18" charset="0"/>
+                          </a:rPr>
+                          <m:t>𝜔</m:t>
+                        </m:r>
+                        <m:r>
+                          <a:rPr lang="en-US" sz="1800" b="0" i="1" smtClean="0">
+                            <a:latin typeface="Cambria Math" panose="02040503050406030204" pitchFamily="18" charset="0"/>
+                          </a:rPr>
+                          <m:t>, </m:t>
+                        </m:r>
+                        <m:r>
+                          <a:rPr lang="en-US" sz="1800" b="0" i="1" smtClean="0">
+                            <a:latin typeface="Cambria Math" panose="02040503050406030204" pitchFamily="18" charset="0"/>
+                          </a:rPr>
+                          <m:t>𝜔</m:t>
+                        </m:r>
+                      </m:e>
+                    </m:d>
+                  </m:oMath>
+                </a14:m>
+                <a:r>
+                  <a:rPr lang="en-US" sz="1800" dirty="0"/>
+                  <a:t>. Typically, </a:t>
+                </a:r>
+                <a14:m>
+                  <m:oMath xmlns:m="http://schemas.openxmlformats.org/officeDocument/2006/math">
+                    <m:r>
+                      <a:rPr lang="en-US" sz="1800" b="0" i="1" smtClean="0">
+                        <a:latin typeface="Cambria Math" panose="02040503050406030204" pitchFamily="18" charset="0"/>
+                      </a:rPr>
+                      <m:t>𝜔</m:t>
+                    </m:r>
+                    <m:r>
+                      <a:rPr lang="en-US" sz="1800" b="0" i="1" smtClean="0">
+                        <a:latin typeface="Cambria Math" panose="02040503050406030204" pitchFamily="18" charset="0"/>
+                      </a:rPr>
+                      <m:t>=</m:t>
+                    </m:r>
+                    <m:f>
+                      <m:fPr>
+                        <m:ctrlPr>
+                          <a:rPr lang="en-US" sz="1800" b="0" i="1" smtClean="0">
+                            <a:latin typeface="Cambria Math" panose="02040503050406030204" pitchFamily="18" charset="0"/>
+                          </a:rPr>
+                        </m:ctrlPr>
+                      </m:fPr>
+                      <m:num>
+                        <m:r>
+                          <a:rPr lang="en-US" sz="1800" b="0" i="1" smtClean="0">
+                            <a:latin typeface="Cambria Math" panose="02040503050406030204" pitchFamily="18" charset="0"/>
+                          </a:rPr>
+                          <m:t>𝜋</m:t>
+                        </m:r>
+                      </m:num>
+                      <m:den>
+                        <m:r>
+                          <a:rPr lang="en-US" sz="1800" b="0" i="1" smtClean="0">
+                            <a:latin typeface="Cambria Math" panose="02040503050406030204" pitchFamily="18" charset="0"/>
+                          </a:rPr>
+                          <m:t>6</m:t>
+                        </m:r>
+                      </m:den>
+                    </m:f>
+                  </m:oMath>
+                </a14:m>
+                <a:endParaRPr lang="en-US" sz="1800" dirty="0"/>
+              </a:p>
+              <a:p>
+                <a:r>
+                  <a:rPr lang="en-US" sz="2000" dirty="0"/>
+                  <a:t>Cuckoo migration method 2</a:t>
+                </a:r>
+              </a:p>
+              <a:p>
+                <a:pPr lvl="1"/>
+                <a14:m>
+                  <m:oMath xmlns:m="http://schemas.openxmlformats.org/officeDocument/2006/math">
+                    <m:sSubSup>
+                      <m:sSubSupPr>
+                        <m:ctrlPr>
+                          <a:rPr lang="en-US" sz="1800" i="1" smtClean="0">
+                            <a:latin typeface="Cambria Math" panose="02040503050406030204" pitchFamily="18" charset="0"/>
+                          </a:rPr>
+                        </m:ctrlPr>
+                      </m:sSubSupPr>
+                      <m:e>
+                        <m:r>
+                          <a:rPr lang="en-US" sz="1800" b="0" i="1" smtClean="0">
+                            <a:latin typeface="Cambria Math" panose="02040503050406030204" pitchFamily="18" charset="0"/>
+                          </a:rPr>
+                          <m:t>𝑥</m:t>
+                        </m:r>
+                      </m:e>
+                      <m:sub>
+                        <m:r>
+                          <a:rPr lang="en-US" sz="1800" b="0" i="1" smtClean="0">
+                            <a:latin typeface="Cambria Math" panose="02040503050406030204" pitchFamily="18" charset="0"/>
+                          </a:rPr>
+                          <m:t>𝑖</m:t>
+                        </m:r>
+                        <m:r>
+                          <a:rPr lang="en-US" sz="1800" b="0" i="1" smtClean="0">
+                            <a:latin typeface="Cambria Math" panose="02040503050406030204" pitchFamily="18" charset="0"/>
+                          </a:rPr>
+                          <m:t>,</m:t>
+                        </m:r>
+                        <m:r>
+                          <a:rPr lang="en-US" sz="1800" b="0" i="1" smtClean="0">
+                            <a:latin typeface="Cambria Math" panose="02040503050406030204" pitchFamily="18" charset="0"/>
+                          </a:rPr>
+                          <m:t>𝑗</m:t>
+                        </m:r>
+                      </m:sub>
+                      <m:sup>
+                        <m:r>
+                          <a:rPr lang="en-US" sz="1800" b="0" i="1" smtClean="0">
+                            <a:latin typeface="Cambria Math" panose="02040503050406030204" pitchFamily="18" charset="0"/>
+                          </a:rPr>
+                          <m:t>𝑛𝑒𝑤</m:t>
+                        </m:r>
+                      </m:sup>
+                    </m:sSubSup>
+                    <m:r>
+                      <a:rPr lang="en-US" sz="1800" b="0" i="1" smtClean="0">
+                        <a:latin typeface="Cambria Math" panose="02040503050406030204" pitchFamily="18" charset="0"/>
+                      </a:rPr>
+                      <m:t>=</m:t>
+                    </m:r>
+                    <m:sSubSup>
+                      <m:sSubSupPr>
+                        <m:ctrlPr>
+                          <a:rPr lang="en-US" sz="1800" b="0" i="1" smtClean="0">
+                            <a:latin typeface="Cambria Math" panose="02040503050406030204" pitchFamily="18" charset="0"/>
+                          </a:rPr>
+                        </m:ctrlPr>
+                      </m:sSubSupPr>
+                      <m:e>
+                        <m:r>
+                          <a:rPr lang="en-US" sz="1800" b="0" i="1" smtClean="0">
+                            <a:latin typeface="Cambria Math" panose="02040503050406030204" pitchFamily="18" charset="0"/>
+                          </a:rPr>
+                          <m:t>𝑥</m:t>
+                        </m:r>
+                      </m:e>
+                      <m:sub>
+                        <m:r>
+                          <a:rPr lang="en-US" sz="1800" b="0" i="1" smtClean="0">
+                            <a:latin typeface="Cambria Math" panose="02040503050406030204" pitchFamily="18" charset="0"/>
+                          </a:rPr>
+                          <m:t>𝑖</m:t>
+                        </m:r>
+                        <m:r>
+                          <a:rPr lang="en-US" sz="1800" b="0" i="1" smtClean="0">
+                            <a:latin typeface="Cambria Math" panose="02040503050406030204" pitchFamily="18" charset="0"/>
+                          </a:rPr>
+                          <m:t>,</m:t>
+                        </m:r>
+                        <m:r>
+                          <a:rPr lang="en-US" sz="1800" b="0" i="1" smtClean="0">
+                            <a:latin typeface="Cambria Math" panose="02040503050406030204" pitchFamily="18" charset="0"/>
+                          </a:rPr>
+                          <m:t>𝑗</m:t>
+                        </m:r>
+                      </m:sub>
+                      <m:sup>
+                        <m:r>
+                          <a:rPr lang="en-US" sz="1800" b="0" i="1" smtClean="0">
+                            <a:latin typeface="Cambria Math" panose="02040503050406030204" pitchFamily="18" charset="0"/>
+                          </a:rPr>
+                          <m:t>𝑜𝑙𝑑</m:t>
+                        </m:r>
+                      </m:sup>
+                    </m:sSubSup>
+                    <m:r>
+                      <a:rPr lang="en-US" sz="1800" b="0" i="1" smtClean="0">
+                        <a:latin typeface="Cambria Math" panose="02040503050406030204" pitchFamily="18" charset="0"/>
+                      </a:rPr>
+                      <m:t>+</m:t>
+                    </m:r>
+                    <m:r>
+                      <a:rPr lang="en-US" sz="1800" b="0" i="1" smtClean="0">
+                        <a:latin typeface="Cambria Math" panose="02040503050406030204" pitchFamily="18" charset="0"/>
+                      </a:rPr>
+                      <m:t>𝐹</m:t>
+                    </m:r>
+                    <m:r>
+                      <a:rPr lang="en-US" sz="1800" b="0" i="1" smtClean="0">
+                        <a:latin typeface="Cambria Math" panose="02040503050406030204" pitchFamily="18" charset="0"/>
+                      </a:rPr>
+                      <m:t>×</m:t>
+                    </m:r>
+                    <m:r>
+                      <a:rPr lang="en-US" sz="1800" b="0" i="1" smtClean="0">
+                        <a:latin typeface="Cambria Math" panose="02040503050406030204" pitchFamily="18" charset="0"/>
+                      </a:rPr>
+                      <m:t>𝑟</m:t>
+                    </m:r>
+                    <m:r>
+                      <a:rPr lang="en-US" sz="1800" b="0" i="1" smtClean="0">
+                        <a:latin typeface="Cambria Math" panose="02040503050406030204" pitchFamily="18" charset="0"/>
+                      </a:rPr>
+                      <m:t>×(</m:t>
+                    </m:r>
+                    <m:sSub>
+                      <m:sSubPr>
+                        <m:ctrlPr>
+                          <a:rPr lang="en-US" sz="1800" b="0" i="1" smtClean="0">
+                            <a:latin typeface="Cambria Math" panose="02040503050406030204" pitchFamily="18" charset="0"/>
+                          </a:rPr>
+                        </m:ctrlPr>
+                      </m:sSubPr>
+                      <m:e>
+                        <m:r>
+                          <a:rPr lang="en-US" sz="1800" b="0" i="1" smtClean="0">
+                            <a:latin typeface="Cambria Math" panose="02040503050406030204" pitchFamily="18" charset="0"/>
+                          </a:rPr>
+                          <m:t>𝑔𝑝</m:t>
+                        </m:r>
+                      </m:e>
+                      <m:sub>
+                        <m:r>
+                          <a:rPr lang="en-US" sz="1800" b="0" i="1" smtClean="0">
+                            <a:latin typeface="Cambria Math" panose="02040503050406030204" pitchFamily="18" charset="0"/>
+                          </a:rPr>
+                          <m:t>𝑗</m:t>
+                        </m:r>
+                      </m:sub>
+                    </m:sSub>
+                    <m:r>
+                      <a:rPr lang="en-US" sz="1800" b="0" i="1" smtClean="0">
+                        <a:latin typeface="Cambria Math" panose="02040503050406030204" pitchFamily="18" charset="0"/>
+                      </a:rPr>
+                      <m:t>−</m:t>
+                    </m:r>
+                    <m:sSubSup>
+                      <m:sSubSupPr>
+                        <m:ctrlPr>
+                          <a:rPr lang="en-US" sz="1800" b="0" i="1" smtClean="0">
+                            <a:latin typeface="Cambria Math" panose="02040503050406030204" pitchFamily="18" charset="0"/>
+                          </a:rPr>
+                        </m:ctrlPr>
+                      </m:sSubSupPr>
+                      <m:e>
+                        <m:r>
+                          <a:rPr lang="en-US" sz="1800" b="0" i="1" smtClean="0">
+                            <a:latin typeface="Cambria Math" panose="02040503050406030204" pitchFamily="18" charset="0"/>
+                          </a:rPr>
+                          <m:t>𝑥</m:t>
+                        </m:r>
+                      </m:e>
+                      <m:sub>
+                        <m:r>
+                          <a:rPr lang="en-US" sz="1800" b="0" i="1" smtClean="0">
+                            <a:latin typeface="Cambria Math" panose="02040503050406030204" pitchFamily="18" charset="0"/>
+                          </a:rPr>
+                          <m:t>𝑖</m:t>
+                        </m:r>
+                        <m:r>
+                          <a:rPr lang="en-US" sz="1800" b="0" i="1" smtClean="0">
+                            <a:latin typeface="Cambria Math" panose="02040503050406030204" pitchFamily="18" charset="0"/>
+                          </a:rPr>
+                          <m:t>,</m:t>
+                        </m:r>
+                        <m:r>
+                          <a:rPr lang="en-US" sz="1800" b="0" i="1" smtClean="0">
+                            <a:latin typeface="Cambria Math" panose="02040503050406030204" pitchFamily="18" charset="0"/>
+                          </a:rPr>
+                          <m:t>𝑗</m:t>
+                        </m:r>
+                      </m:sub>
+                      <m:sup>
+                        <m:r>
+                          <a:rPr lang="en-US" sz="1800" b="0" i="1" smtClean="0">
+                            <a:latin typeface="Cambria Math" panose="02040503050406030204" pitchFamily="18" charset="0"/>
+                          </a:rPr>
+                          <m:t>𝑜𝑙𝑑</m:t>
+                        </m:r>
+                      </m:sup>
+                    </m:sSubSup>
+                    <m:r>
+                      <a:rPr lang="en-US" sz="1800" b="0" i="1" smtClean="0">
+                        <a:latin typeface="Cambria Math" panose="02040503050406030204" pitchFamily="18" charset="0"/>
+                      </a:rPr>
+                      <m:t>)</m:t>
+                    </m:r>
+                  </m:oMath>
+                </a14:m>
+                <a:endParaRPr lang="en-US" sz="1800" dirty="0"/>
+              </a:p>
+              <a:p>
+                <a:pPr lvl="1"/>
+                <a:r>
+                  <a:rPr lang="en-US" sz="1800" dirty="0"/>
+                  <a:t>F is a constant, </a:t>
+                </a:r>
+                <a14:m>
+                  <m:oMath xmlns:m="http://schemas.openxmlformats.org/officeDocument/2006/math">
+                    <m:r>
+                      <a:rPr lang="en-US" sz="1800" b="0" i="1" smtClean="0">
+                        <a:latin typeface="Cambria Math" panose="02040503050406030204" pitchFamily="18" charset="0"/>
+                      </a:rPr>
+                      <m:t>𝑟</m:t>
+                    </m:r>
+                    <m:r>
+                      <a:rPr lang="en-US" sz="1800" b="0" i="1" smtClean="0">
+                        <a:latin typeface="Cambria Math" panose="02040503050406030204" pitchFamily="18" charset="0"/>
+                      </a:rPr>
+                      <m:t> ~ </m:t>
+                    </m:r>
+                    <m:r>
+                      <a:rPr lang="en-US" sz="1800" b="0" i="1" smtClean="0">
+                        <a:latin typeface="Cambria Math" panose="02040503050406030204" pitchFamily="18" charset="0"/>
+                      </a:rPr>
+                      <m:t>𝑈</m:t>
+                    </m:r>
+                    <m:r>
+                      <a:rPr lang="en-US" sz="1800" b="0" i="1" smtClean="0">
+                        <a:latin typeface="Cambria Math" panose="02040503050406030204" pitchFamily="18" charset="0"/>
+                      </a:rPr>
+                      <m:t>(0, 1)</m:t>
+                    </m:r>
+                  </m:oMath>
+                </a14:m>
+                <a:endParaRPr lang="en-US" sz="1800" dirty="0"/>
+              </a:p>
+            </p:txBody>
+          </p:sp>
+        </mc:Choice>
+        <mc:Fallback>
+          <p:sp>
+            <p:nvSpPr>
+              <p:cNvPr id="3" name="Content Placeholder 2">
+                <a:extLst>
+                  <a:ext uri="{FF2B5EF4-FFF2-40B4-BE49-F238E27FC236}">
+                    <a16:creationId xmlns:a16="http://schemas.microsoft.com/office/drawing/2014/main" id="{18ED27A9-7C5A-4401-ACBD-37470CB7427E}"/>
+                  </a:ext>
+                </a:extLst>
+              </p:cNvPr>
+              <p:cNvSpPr>
+                <a:spLocks noGrp="1" noRot="1" noChangeAspect="1" noMove="1" noResize="1" noEditPoints="1" noAdjustHandles="1" noChangeArrowheads="1" noChangeShapeType="1" noTextEdit="1"/>
+              </p:cNvSpPr>
+              <p:nvPr>
+                <p:ph idx="1"/>
+              </p:nvPr>
+            </p:nvSpPr>
+            <p:spPr>
+              <a:xfrm>
+                <a:off x="1261872" y="1828800"/>
+                <a:ext cx="8595360" cy="4351337"/>
+              </a:xfrm>
+              <a:blipFill>
+                <a:blip r:embed="rId2"/>
+                <a:stretch>
+                  <a:fillRect l="-213" t="-1681" b="-1681"/>
+                </a:stretch>
+              </a:blipFill>
+            </p:spPr>
+            <p:txBody>
+              <a:bodyPr/>
+              <a:lstStyle/>
+              <a:p>
+                <a:r>
+                  <a:rPr lang="en-US">
+                    <a:noFill/>
+                  </a:rPr>
+                  <a:t> </a:t>
+                </a:r>
+              </a:p>
+            </p:txBody>
+          </p:sp>
+        </mc:Fallback>
+      </mc:AlternateContent>
       <p:sp>
         <p:nvSpPr>
           <p:cNvPr id="15" name="Rectangle 9">
@@ -4628,8 +5171,8 @@
           </a:p>
         </p:txBody>
       </p:sp>
-      <mc:AlternateContent xmlns:mc="http://schemas.openxmlformats.org/markup-compatibility/2006">
-        <mc:Choice xmlns:a14="http://schemas.microsoft.com/office/drawing/2010/main" Requires="a14">
+      <mc:AlternateContent xmlns:mc="http://schemas.openxmlformats.org/markup-compatibility/2006" xmlns:a14="http://schemas.microsoft.com/office/drawing/2010/main">
+        <mc:Choice Requires="a14">
           <p:sp>
             <p:nvSpPr>
               <p:cNvPr id="3" name="Content Placeholder 2">
@@ -4918,7 +5461,7 @@
             </p:txBody>
           </p:sp>
         </mc:Choice>
-        <mc:Fallback>
+        <mc:Fallback xmlns="">
           <p:sp>
             <p:nvSpPr>
               <p:cNvPr id="3" name="Content Placeholder 2">
@@ -5155,8 +5698,8 @@
           </a:p>
         </p:txBody>
       </p:sp>
-      <mc:AlternateContent xmlns:mc="http://schemas.openxmlformats.org/markup-compatibility/2006">
-        <mc:Choice xmlns:a14="http://schemas.microsoft.com/office/drawing/2010/main" Requires="a14">
+      <mc:AlternateContent xmlns:mc="http://schemas.openxmlformats.org/markup-compatibility/2006" xmlns:a14="http://schemas.microsoft.com/office/drawing/2010/main">
+        <mc:Choice Requires="a14">
           <p:sp>
             <p:nvSpPr>
               <p:cNvPr id="3" name="Content Placeholder 2">
@@ -5499,7 +6042,7 @@
             </p:txBody>
           </p:sp>
         </mc:Choice>
-        <mc:Fallback>
+        <mc:Fallback xmlns="">
           <p:sp>
             <p:nvSpPr>
               <p:cNvPr id="3" name="Content Placeholder 2">
@@ -5736,8 +6279,8 @@
           </a:p>
         </p:txBody>
       </p:sp>
-      <mc:AlternateContent xmlns:mc="http://schemas.openxmlformats.org/markup-compatibility/2006">
-        <mc:Choice xmlns:a14="http://schemas.microsoft.com/office/drawing/2010/main" Requires="a14">
+      <mc:AlternateContent xmlns:mc="http://schemas.openxmlformats.org/markup-compatibility/2006" xmlns:a14="http://schemas.microsoft.com/office/drawing/2010/main">
+        <mc:Choice Requires="a14">
           <p:sp>
             <p:nvSpPr>
               <p:cNvPr id="3" name="Content Placeholder 2">
@@ -6075,7 +6618,7 @@
             </p:txBody>
           </p:sp>
         </mc:Choice>
-        <mc:Fallback>
+        <mc:Fallback xmlns="">
           <p:sp>
             <p:nvSpPr>
               <p:cNvPr id="3" name="Content Placeholder 2">
@@ -6312,8 +6855,8 @@
           </a:p>
         </p:txBody>
       </p:sp>
-      <mc:AlternateContent xmlns:mc="http://schemas.openxmlformats.org/markup-compatibility/2006">
-        <mc:Choice xmlns:a14="http://schemas.microsoft.com/office/drawing/2010/main" Requires="a14">
+      <mc:AlternateContent xmlns:mc="http://schemas.openxmlformats.org/markup-compatibility/2006" xmlns:a14="http://schemas.microsoft.com/office/drawing/2010/main">
+        <mc:Choice Requires="a14">
           <p:sp>
             <p:nvSpPr>
               <p:cNvPr id="3" name="Content Placeholder 2">
@@ -6750,7 +7293,7 @@
             </p:txBody>
           </p:sp>
         </mc:Choice>
-        <mc:Fallback>
+        <mc:Fallback xmlns="">
           <p:sp>
             <p:nvSpPr>
               <p:cNvPr id="3" name="Content Placeholder 2">
@@ -8280,8 +8823,8 @@
           </a:p>
         </p:txBody>
       </p:sp>
-      <mc:AlternateContent xmlns:mc="http://schemas.openxmlformats.org/markup-compatibility/2006">
-        <mc:Choice xmlns:a14="http://schemas.microsoft.com/office/drawing/2010/main" Requires="a14">
+      <mc:AlternateContent xmlns:mc="http://schemas.openxmlformats.org/markup-compatibility/2006" xmlns:a14="http://schemas.microsoft.com/office/drawing/2010/main">
+        <mc:Choice Requires="a14">
           <p:sp>
             <p:nvSpPr>
               <p:cNvPr id="3" name="Content Placeholder 2">
@@ -8844,7 +9387,7 @@
             </p:txBody>
           </p:sp>
         </mc:Choice>
-        <mc:Fallback>
+        <mc:Fallback xmlns="">
           <p:sp>
             <p:nvSpPr>
               <p:cNvPr id="3" name="Content Placeholder 2">
@@ -9146,8 +9689,8 @@
           </a:p>
         </p:txBody>
       </p:sp>
-      <mc:AlternateContent xmlns:mc="http://schemas.openxmlformats.org/markup-compatibility/2006">
-        <mc:Choice xmlns:a14="http://schemas.microsoft.com/office/drawing/2010/main" Requires="a14">
+      <mc:AlternateContent xmlns:mc="http://schemas.openxmlformats.org/markup-compatibility/2006" xmlns:a14="http://schemas.microsoft.com/office/drawing/2010/main">
+        <mc:Choice Requires="a14">
           <p:sp>
             <p:nvSpPr>
               <p:cNvPr id="3" name="Content Placeholder 2">
@@ -10224,7 +10767,7 @@
             </p:txBody>
           </p:sp>
         </mc:Choice>
-        <mc:Fallback>
+        <mc:Fallback xmlns="">
           <p:sp>
             <p:nvSpPr>
               <p:cNvPr id="3" name="Content Placeholder 2">
@@ -10461,38 +11004,310 @@
           </a:p>
         </p:txBody>
       </p:sp>
-      <p:sp>
-        <p:nvSpPr>
-          <p:cNvPr id="3" name="Content Placeholder 2">
-            <a:extLst>
-              <a:ext uri="{FF2B5EF4-FFF2-40B4-BE49-F238E27FC236}">
-                <a16:creationId xmlns:a16="http://schemas.microsoft.com/office/drawing/2014/main" id="{18ED27A9-7C5A-4401-ACBD-37470CB7427E}"/>
-              </a:ext>
-            </a:extLst>
-          </p:cNvPr>
-          <p:cNvSpPr>
-            <a:spLocks noGrp="1"/>
-          </p:cNvSpPr>
-          <p:nvPr>
-            <p:ph idx="1"/>
-          </p:nvPr>
-        </p:nvSpPr>
-        <p:spPr>
-          <a:xfrm>
-            <a:off x="1261872" y="1828800"/>
-            <a:ext cx="8595360" cy="4351337"/>
-          </a:xfrm>
-        </p:spPr>
-        <p:txBody>
-          <a:bodyPr>
-            <a:normAutofit/>
-          </a:bodyPr>
-          <a:lstStyle/>
-          <a:p>
-            <a:endParaRPr lang="en-US" dirty="0"/>
-          </a:p>
-        </p:txBody>
-      </p:sp>
+      <mc:AlternateContent xmlns:mc="http://schemas.openxmlformats.org/markup-compatibility/2006">
+        <mc:Choice xmlns:a14="http://schemas.microsoft.com/office/drawing/2010/main" Requires="a14">
+          <p:sp>
+            <p:nvSpPr>
+              <p:cNvPr id="3" name="Content Placeholder 2">
+                <a:extLst>
+                  <a:ext uri="{FF2B5EF4-FFF2-40B4-BE49-F238E27FC236}">
+                    <a16:creationId xmlns:a16="http://schemas.microsoft.com/office/drawing/2014/main" id="{18ED27A9-7C5A-4401-ACBD-37470CB7427E}"/>
+                  </a:ext>
+                </a:extLst>
+              </p:cNvPr>
+              <p:cNvSpPr>
+                <a:spLocks noGrp="1"/>
+              </p:cNvSpPr>
+              <p:nvPr>
+                <p:ph idx="1"/>
+              </p:nvPr>
+            </p:nvSpPr>
+            <p:spPr>
+              <a:xfrm>
+                <a:off x="1261872" y="1828800"/>
+                <a:ext cx="8595360" cy="4351337"/>
+              </a:xfrm>
+            </p:spPr>
+            <p:txBody>
+              <a:bodyPr>
+                <a:normAutofit/>
+              </a:bodyPr>
+              <a:lstStyle/>
+              <a:p>
+                <a:r>
+                  <a:rPr lang="en-US" sz="2000" dirty="0"/>
+                  <a:t>Given and undirected graph G = (V, E), a colouring C is a function </a:t>
+                </a:r>
+                <a14:m>
+                  <m:oMath xmlns:m="http://schemas.openxmlformats.org/officeDocument/2006/math">
+                    <m:r>
+                      <a:rPr lang="en-US" sz="2000" i="1">
+                        <a:latin typeface="Cambria Math" panose="02040503050406030204" pitchFamily="18" charset="0"/>
+                      </a:rPr>
+                      <m:t>𝐶</m:t>
+                    </m:r>
+                    <m:r>
+                      <a:rPr lang="en-US" sz="2000" i="1">
+                        <a:latin typeface="Cambria Math" panose="02040503050406030204" pitchFamily="18" charset="0"/>
+                      </a:rPr>
+                      <m:t> :</m:t>
+                    </m:r>
+                    <m:r>
+                      <a:rPr lang="en-US" sz="2000" i="1">
+                        <a:latin typeface="Cambria Math" panose="02040503050406030204" pitchFamily="18" charset="0"/>
+                      </a:rPr>
+                      <m:t>𝑉</m:t>
+                    </m:r>
+                    <m:r>
+                      <a:rPr lang="en-US" sz="2000" i="1">
+                        <a:latin typeface="Cambria Math" panose="02040503050406030204" pitchFamily="18" charset="0"/>
+                      </a:rPr>
+                      <m:t>→</m:t>
+                    </m:r>
+                    <m:r>
+                      <a:rPr lang="en-US" sz="2000" i="1">
+                        <a:latin typeface="Cambria Math" panose="02040503050406030204" pitchFamily="18" charset="0"/>
+                      </a:rPr>
+                      <m:t>ℕ</m:t>
+                    </m:r>
+                  </m:oMath>
+                </a14:m>
+                <a:endParaRPr lang="en-US" sz="2000" dirty="0"/>
+              </a:p>
+              <a:p>
+                <a:pPr lvl="1"/>
+                <a:r>
+                  <a:rPr lang="en-US" sz="1800" dirty="0"/>
+                  <a:t>In a colouring c, we denote the colour of vertex v as </a:t>
+                </a:r>
+                <a14:m>
+                  <m:oMath xmlns:m="http://schemas.openxmlformats.org/officeDocument/2006/math">
+                    <m:sSub>
+                      <m:sSubPr>
+                        <m:ctrlPr>
+                          <a:rPr lang="en-US" sz="1800" i="1" smtClean="0">
+                            <a:latin typeface="Cambria Math" panose="02040503050406030204" pitchFamily="18" charset="0"/>
+                          </a:rPr>
+                        </m:ctrlPr>
+                      </m:sSubPr>
+                      <m:e>
+                        <m:r>
+                          <a:rPr lang="en-US" sz="1800" b="0" i="1" smtClean="0">
+                            <a:latin typeface="Cambria Math" panose="02040503050406030204" pitchFamily="18" charset="0"/>
+                          </a:rPr>
+                          <m:t>𝑐</m:t>
+                        </m:r>
+                      </m:e>
+                      <m:sub>
+                        <m:r>
+                          <a:rPr lang="en-US" sz="1800" b="0" i="1" smtClean="0">
+                            <a:latin typeface="Cambria Math" panose="02040503050406030204" pitchFamily="18" charset="0"/>
+                          </a:rPr>
+                          <m:t>𝑣</m:t>
+                        </m:r>
+                      </m:sub>
+                    </m:sSub>
+                  </m:oMath>
+                </a14:m>
+                <a:endParaRPr lang="en-US" sz="1800" dirty="0"/>
+              </a:p>
+              <a:p>
+                <a:r>
+                  <a:rPr lang="en-US" sz="2000" dirty="0"/>
+                  <a:t>A conflict in a colouring c is an edge </a:t>
+                </a:r>
+                <a14:m>
+                  <m:oMath xmlns:m="http://schemas.openxmlformats.org/officeDocument/2006/math">
+                    <m:r>
+                      <a:rPr lang="en-US" sz="2000" b="0" i="1" smtClean="0">
+                        <a:latin typeface="Cambria Math" panose="02040503050406030204" pitchFamily="18" charset="0"/>
+                      </a:rPr>
+                      <m:t>𝑢𝑣</m:t>
+                    </m:r>
+                    <m:r>
+                      <a:rPr lang="en-US" sz="2000" b="0" i="1" smtClean="0">
+                        <a:latin typeface="Cambria Math" panose="02040503050406030204" pitchFamily="18" charset="0"/>
+                      </a:rPr>
+                      <m:t>∈</m:t>
+                    </m:r>
+                    <m:r>
+                      <a:rPr lang="en-US" sz="2000" b="0" i="1" smtClean="0">
+                        <a:latin typeface="Cambria Math" panose="02040503050406030204" pitchFamily="18" charset="0"/>
+                      </a:rPr>
+                      <m:t>𝐸</m:t>
+                    </m:r>
+                  </m:oMath>
+                </a14:m>
+                <a:r>
+                  <a:rPr lang="en-US" sz="2000" dirty="0"/>
+                  <a:t> </a:t>
+                </a:r>
+                <a:r>
+                  <a:rPr lang="en-US" sz="2000" dirty="0" err="1"/>
+                  <a:t>s.t.</a:t>
+                </a:r>
+                <a:r>
+                  <a:rPr lang="en-US" sz="2000" dirty="0"/>
+                  <a:t> </a:t>
+                </a:r>
+                <a14:m>
+                  <m:oMath xmlns:m="http://schemas.openxmlformats.org/officeDocument/2006/math">
+                    <m:sSub>
+                      <m:sSubPr>
+                        <m:ctrlPr>
+                          <a:rPr lang="en-US" sz="2000" i="1" smtClean="0">
+                            <a:latin typeface="Cambria Math" panose="02040503050406030204" pitchFamily="18" charset="0"/>
+                          </a:rPr>
+                        </m:ctrlPr>
+                      </m:sSubPr>
+                      <m:e>
+                        <m:r>
+                          <a:rPr lang="en-US" sz="2000" b="0" i="1" smtClean="0">
+                            <a:latin typeface="Cambria Math" panose="02040503050406030204" pitchFamily="18" charset="0"/>
+                          </a:rPr>
+                          <m:t>𝑐</m:t>
+                        </m:r>
+                      </m:e>
+                      <m:sub>
+                        <m:r>
+                          <a:rPr lang="en-US" sz="2000" b="0" i="1" smtClean="0">
+                            <a:latin typeface="Cambria Math" panose="02040503050406030204" pitchFamily="18" charset="0"/>
+                          </a:rPr>
+                          <m:t>𝑢</m:t>
+                        </m:r>
+                      </m:sub>
+                    </m:sSub>
+                    <m:r>
+                      <a:rPr lang="en-US" sz="2000" b="0" i="1" smtClean="0">
+                        <a:latin typeface="Cambria Math" panose="02040503050406030204" pitchFamily="18" charset="0"/>
+                      </a:rPr>
+                      <m:t>=</m:t>
+                    </m:r>
+                    <m:sSub>
+                      <m:sSubPr>
+                        <m:ctrlPr>
+                          <a:rPr lang="en-US" sz="2000" b="0" i="1" smtClean="0">
+                            <a:latin typeface="Cambria Math" panose="02040503050406030204" pitchFamily="18" charset="0"/>
+                          </a:rPr>
+                        </m:ctrlPr>
+                      </m:sSubPr>
+                      <m:e>
+                        <m:r>
+                          <a:rPr lang="en-US" sz="2000" b="0" i="1" smtClean="0">
+                            <a:latin typeface="Cambria Math" panose="02040503050406030204" pitchFamily="18" charset="0"/>
+                          </a:rPr>
+                          <m:t>𝑐</m:t>
+                        </m:r>
+                      </m:e>
+                      <m:sub>
+                        <m:r>
+                          <a:rPr lang="en-US" sz="2000" b="0" i="1" smtClean="0">
+                            <a:latin typeface="Cambria Math" panose="02040503050406030204" pitchFamily="18" charset="0"/>
+                          </a:rPr>
+                          <m:t>𝑣</m:t>
+                        </m:r>
+                      </m:sub>
+                    </m:sSub>
+                  </m:oMath>
+                </a14:m>
+                <a:endParaRPr lang="en-US" sz="2000" dirty="0"/>
+              </a:p>
+              <a:p>
+                <a:r>
+                  <a:rPr lang="en-US" sz="2000" dirty="0"/>
+                  <a:t>A legal colouring is a colouring with no conflicts</a:t>
+                </a:r>
+              </a:p>
+              <a:p>
+                <a:r>
+                  <a:rPr lang="en-US" sz="2000" dirty="0"/>
+                  <a:t>The goal of the Graph Colouring Problem (GPC) is to find a legal colouring that minimises the number of colours used</a:t>
+                </a:r>
+              </a:p>
+              <a:p>
+                <a:pPr lvl="1"/>
+                <a:r>
+                  <a:rPr lang="en-US" sz="1800" dirty="0"/>
+                  <a:t>The fewest number of colours possible to colour G with is called the chromatic number of G denoted </a:t>
+                </a:r>
+                <a14:m>
+                  <m:oMath xmlns:m="http://schemas.openxmlformats.org/officeDocument/2006/math">
+                    <m:sSub>
+                      <m:sSubPr>
+                        <m:ctrlPr>
+                          <a:rPr lang="en-US" sz="1800" i="1" smtClean="0">
+                            <a:latin typeface="Cambria Math" panose="02040503050406030204" pitchFamily="18" charset="0"/>
+                          </a:rPr>
+                        </m:ctrlPr>
+                      </m:sSubPr>
+                      <m:e>
+                        <m:r>
+                          <a:rPr lang="en-US" sz="1800" b="0" i="1" smtClean="0">
+                            <a:latin typeface="Cambria Math" panose="02040503050406030204" pitchFamily="18" charset="0"/>
+                          </a:rPr>
+                          <m:t>𝜒</m:t>
+                        </m:r>
+                      </m:e>
+                      <m:sub>
+                        <m:r>
+                          <a:rPr lang="en-US" sz="1800" b="0" i="1" smtClean="0">
+                            <a:latin typeface="Cambria Math" panose="02040503050406030204" pitchFamily="18" charset="0"/>
+                          </a:rPr>
+                          <m:t>𝐺</m:t>
+                        </m:r>
+                      </m:sub>
+                    </m:sSub>
+                  </m:oMath>
+                </a14:m>
+                <a:endParaRPr lang="en-US" sz="1800" dirty="0"/>
+              </a:p>
+            </p:txBody>
+          </p:sp>
+        </mc:Choice>
+        <mc:Fallback>
+          <p:sp>
+            <p:nvSpPr>
+              <p:cNvPr id="3" name="Content Placeholder 2">
+                <a:extLst>
+                  <a:ext uri="{FF2B5EF4-FFF2-40B4-BE49-F238E27FC236}">
+                    <a16:creationId xmlns:a16="http://schemas.microsoft.com/office/drawing/2014/main" id="{18ED27A9-7C5A-4401-ACBD-37470CB7427E}"/>
+                  </a:ext>
+                </a:extLst>
+              </p:cNvPr>
+              <p:cNvSpPr>
+                <a:spLocks noGrp="1" noRot="1" noChangeAspect="1" noMove="1" noResize="1" noEditPoints="1" noAdjustHandles="1" noChangeArrowheads="1" noChangeShapeType="1" noTextEdit="1"/>
+              </p:cNvSpPr>
+              <p:nvPr>
+                <p:ph idx="1"/>
+              </p:nvPr>
+            </p:nvSpPr>
+            <p:spPr>
+              <a:xfrm>
+                <a:off x="1261872" y="1828800"/>
+                <a:ext cx="8595360" cy="4351337"/>
+              </a:xfrm>
+              <a:blipFill>
+                <a:blip r:embed="rId2"/>
+                <a:stretch>
+                  <a:fillRect l="-284" t="-1120"/>
+                </a:stretch>
+              </a:blipFill>
+            </p:spPr>
+            <p:txBody>
+              <a:bodyPr/>
+              <a:lstStyle/>
+              <a:p>
+                <a:r>
+                  <a:rPr lang="en-US">
+                    <a:noFill/>
+                  </a:rPr>
+                  <a:t> </a:t>
+                </a:r>
+              </a:p>
+            </p:txBody>
+          </p:sp>
+        </mc:Fallback>
+      </mc:AlternateContent>
       <p:sp>
         <p:nvSpPr>
           <p:cNvPr id="15" name="Rectangle 9">
@@ -11274,8 +12089,8 @@
           </a:p>
         </p:txBody>
       </p:sp>
-      <mc:AlternateContent xmlns:mc="http://schemas.openxmlformats.org/markup-compatibility/2006">
-        <mc:Choice xmlns:a14="http://schemas.microsoft.com/office/drawing/2010/main" Requires="a14">
+      <mc:AlternateContent xmlns:mc="http://schemas.openxmlformats.org/markup-compatibility/2006" xmlns:a14="http://schemas.microsoft.com/office/drawing/2010/main">
+        <mc:Choice Requires="a14">
           <p:sp>
             <p:nvSpPr>
               <p:cNvPr id="3" name="Content Placeholder 2">
@@ -11555,11 +12370,15 @@
                       <m:rPr>
                         <m:sty m:val="p"/>
                       </m:rPr>
-                      <a:rPr lang="en-US" b="0" i="1" dirty="0" smtClean="0"/>
+                      <a:rPr lang="en-US" b="0" i="1" dirty="0" smtClean="0">
+                        <a:latin typeface="Cambria Math" panose="02040503050406030204" pitchFamily="18" charset="0"/>
+                      </a:rPr>
                       <m:t>β</m:t>
                     </m:r>
                     <m:r>
-                      <a:rPr lang="en-US" b="0" i="1" dirty="0" smtClean="0"/>
+                      <a:rPr lang="en-US" b="0" i="1" dirty="0" smtClean="0">
+                        <a:latin typeface="Cambria Math" panose="02040503050406030204" pitchFamily="18" charset="0"/>
+                      </a:rPr>
                       <m:t>)</m:t>
                     </m:r>
                   </m:oMath>
@@ -11675,7 +12494,7 @@
             </p:txBody>
           </p:sp>
         </mc:Choice>
-        <mc:Fallback>
+        <mc:Fallback xmlns="">
           <p:sp>
             <p:nvSpPr>
               <p:cNvPr id="3" name="Content Placeholder 2">
@@ -11912,8 +12731,8 @@
           </a:p>
         </p:txBody>
       </p:sp>
-      <mc:AlternateContent xmlns:mc="http://schemas.openxmlformats.org/markup-compatibility/2006">
-        <mc:Choice xmlns:a14="http://schemas.microsoft.com/office/drawing/2010/main" Requires="a14">
+      <mc:AlternateContent xmlns:mc="http://schemas.openxmlformats.org/markup-compatibility/2006" xmlns:a14="http://schemas.microsoft.com/office/drawing/2010/main">
+        <mc:Choice Requires="a14">
           <p:sp>
             <p:nvSpPr>
               <p:cNvPr id="3" name="Content Placeholder 2">
@@ -12001,7 +12820,7 @@
             </p:txBody>
           </p:sp>
         </mc:Choice>
-        <mc:Fallback>
+        <mc:Fallback xmlns="">
           <p:sp>
             <p:nvSpPr>
               <p:cNvPr id="3" name="Content Placeholder 2">
@@ -12102,8 +12921,8 @@
           </a:fontRef>
         </p:style>
       </p:sp>
-      <mc:AlternateContent xmlns:mc="http://schemas.openxmlformats.org/markup-compatibility/2006">
-        <mc:Choice xmlns:a14="http://schemas.microsoft.com/office/drawing/2010/main" Requires="a14">
+      <mc:AlternateContent xmlns:mc="http://schemas.openxmlformats.org/markup-compatibility/2006" xmlns:a14="http://schemas.microsoft.com/office/drawing/2010/main">
+        <mc:Choice Requires="a14">
           <p:sp>
             <p:nvSpPr>
               <p:cNvPr id="5" name="TextBox 4">
@@ -12441,7 +13260,7 @@
             </p:txBody>
           </p:sp>
         </mc:Choice>
-        <mc:Fallback>
+        <mc:Fallback xmlns="">
           <p:sp>
             <p:nvSpPr>
               <p:cNvPr id="5" name="TextBox 4">
@@ -13016,38 +13835,528 @@
           </a:p>
         </p:txBody>
       </p:sp>
-      <p:sp>
-        <p:nvSpPr>
-          <p:cNvPr id="3" name="Content Placeholder 2">
-            <a:extLst>
-              <a:ext uri="{FF2B5EF4-FFF2-40B4-BE49-F238E27FC236}">
-                <a16:creationId xmlns:a16="http://schemas.microsoft.com/office/drawing/2014/main" id="{18ED27A9-7C5A-4401-ACBD-37470CB7427E}"/>
-              </a:ext>
-            </a:extLst>
-          </p:cNvPr>
-          <p:cNvSpPr>
-            <a:spLocks noGrp="1"/>
-          </p:cNvSpPr>
-          <p:nvPr>
-            <p:ph idx="1"/>
-          </p:nvPr>
-        </p:nvSpPr>
-        <p:spPr>
-          <a:xfrm>
-            <a:off x="1261872" y="1828800"/>
-            <a:ext cx="8595360" cy="4351337"/>
-          </a:xfrm>
-        </p:spPr>
-        <p:txBody>
-          <a:bodyPr>
-            <a:normAutofit/>
-          </a:bodyPr>
-          <a:lstStyle/>
-          <a:p>
-            <a:endParaRPr lang="en-US" dirty="0"/>
-          </a:p>
-        </p:txBody>
-      </p:sp>
+      <mc:AlternateContent xmlns:mc="http://schemas.openxmlformats.org/markup-compatibility/2006">
+        <mc:Choice xmlns:a14="http://schemas.microsoft.com/office/drawing/2010/main" Requires="a14">
+          <p:sp>
+            <p:nvSpPr>
+              <p:cNvPr id="3" name="Content Placeholder 2">
+                <a:extLst>
+                  <a:ext uri="{FF2B5EF4-FFF2-40B4-BE49-F238E27FC236}">
+                    <a16:creationId xmlns:a16="http://schemas.microsoft.com/office/drawing/2014/main" id="{18ED27A9-7C5A-4401-ACBD-37470CB7427E}"/>
+                  </a:ext>
+                </a:extLst>
+              </p:cNvPr>
+              <p:cNvSpPr>
+                <a:spLocks noGrp="1"/>
+              </p:cNvSpPr>
+              <p:nvPr>
+                <p:ph idx="1"/>
+              </p:nvPr>
+            </p:nvSpPr>
+            <p:spPr>
+              <a:xfrm>
+                <a:off x="1261872" y="1828800"/>
+                <a:ext cx="8595360" cy="4351337"/>
+              </a:xfrm>
+            </p:spPr>
+            <p:txBody>
+              <a:bodyPr>
+                <a:normAutofit/>
+              </a:bodyPr>
+              <a:lstStyle/>
+              <a:p>
+                <a:r>
+                  <a:rPr lang="en-US" sz="2000" dirty="0"/>
+                  <a:t>At each iteration, each cuckoo lays between 5 and 20 eggs</a:t>
+                </a:r>
+              </a:p>
+              <a:p>
+                <a:r>
+                  <a:rPr lang="en-US" sz="2000" dirty="0"/>
+                  <a:t>Each egg is laid within some Egg Laying Radius (ELR) of the original cuckoo</a:t>
+                </a:r>
+              </a:p>
+              <a:p>
+                <a:pPr lvl="1"/>
+                <a14:m>
+                  <m:oMath xmlns:m="http://schemas.openxmlformats.org/officeDocument/2006/math">
+                    <m:sSub>
+                      <m:sSubPr>
+                        <m:ctrlPr>
+                          <a:rPr lang="en-US" sz="1800" i="1" smtClean="0">
+                            <a:latin typeface="Cambria Math" panose="02040503050406030204" pitchFamily="18" charset="0"/>
+                          </a:rPr>
+                        </m:ctrlPr>
+                      </m:sSubPr>
+                      <m:e>
+                        <m:r>
+                          <a:rPr lang="en-US" sz="1800" b="0" i="1" smtClean="0">
+                            <a:latin typeface="Cambria Math" panose="02040503050406030204" pitchFamily="18" charset="0"/>
+                          </a:rPr>
+                          <m:t>𝐸𝐿𝑅</m:t>
+                        </m:r>
+                      </m:e>
+                      <m:sub>
+                        <m:r>
+                          <a:rPr lang="en-US" sz="1800" b="0" i="1" smtClean="0">
+                            <a:latin typeface="Cambria Math" panose="02040503050406030204" pitchFamily="18" charset="0"/>
+                          </a:rPr>
+                          <m:t>𝑖</m:t>
+                        </m:r>
+                      </m:sub>
+                    </m:sSub>
+                    <m:r>
+                      <a:rPr lang="en-US" sz="1800" b="0" i="1" smtClean="0">
+                        <a:latin typeface="Cambria Math" panose="02040503050406030204" pitchFamily="18" charset="0"/>
+                      </a:rPr>
+                      <m:t>=</m:t>
+                    </m:r>
+                    <m:r>
+                      <a:rPr lang="en-US" sz="1800" b="0" i="1" smtClean="0">
+                        <a:latin typeface="Cambria Math" panose="02040503050406030204" pitchFamily="18" charset="0"/>
+                      </a:rPr>
+                      <m:t>𝛼</m:t>
+                    </m:r>
+                    <m:f>
+                      <m:fPr>
+                        <m:ctrlPr>
+                          <a:rPr lang="en-US" sz="1800" b="0" i="1" smtClean="0">
+                            <a:latin typeface="Cambria Math" panose="02040503050406030204" pitchFamily="18" charset="0"/>
+                          </a:rPr>
+                        </m:ctrlPr>
+                      </m:fPr>
+                      <m:num>
+                        <m:r>
+                          <a:rPr lang="en-US" sz="1800" b="0" i="1" smtClean="0">
+                            <a:latin typeface="Cambria Math" panose="02040503050406030204" pitchFamily="18" charset="0"/>
+                          </a:rPr>
+                          <m:t>𝑛𝑢𝑚𝑏𝑒𝑟</m:t>
+                        </m:r>
+                        <m:r>
+                          <a:rPr lang="en-US" sz="1800" b="0" i="1" smtClean="0">
+                            <a:latin typeface="Cambria Math" panose="02040503050406030204" pitchFamily="18" charset="0"/>
+                          </a:rPr>
+                          <m:t> </m:t>
+                        </m:r>
+                        <m:r>
+                          <a:rPr lang="en-US" sz="1800" b="0" i="1" smtClean="0">
+                            <a:latin typeface="Cambria Math" panose="02040503050406030204" pitchFamily="18" charset="0"/>
+                          </a:rPr>
+                          <m:t>𝑜𝑓</m:t>
+                        </m:r>
+                        <m:r>
+                          <a:rPr lang="en-US" sz="1800" b="0" i="1" smtClean="0">
+                            <a:latin typeface="Cambria Math" panose="02040503050406030204" pitchFamily="18" charset="0"/>
+                          </a:rPr>
+                          <m:t> </m:t>
+                        </m:r>
+                        <m:r>
+                          <a:rPr lang="en-US" sz="1800" b="0" i="1" smtClean="0">
+                            <a:latin typeface="Cambria Math" panose="02040503050406030204" pitchFamily="18" charset="0"/>
+                          </a:rPr>
+                          <m:t>𝑒𝑔𝑔𝑠</m:t>
+                        </m:r>
+                        <m:r>
+                          <a:rPr lang="en-US" sz="1800" b="0" i="1" smtClean="0">
+                            <a:latin typeface="Cambria Math" panose="02040503050406030204" pitchFamily="18" charset="0"/>
+                          </a:rPr>
+                          <m:t> </m:t>
+                        </m:r>
+                        <m:r>
+                          <a:rPr lang="en-US" sz="1800" b="0" i="1" smtClean="0">
+                            <a:latin typeface="Cambria Math" panose="02040503050406030204" pitchFamily="18" charset="0"/>
+                          </a:rPr>
+                          <m:t>𝑙𝑎𝑖𝑑</m:t>
+                        </m:r>
+                        <m:r>
+                          <a:rPr lang="en-US" sz="1800" b="0" i="1" smtClean="0">
+                            <a:latin typeface="Cambria Math" panose="02040503050406030204" pitchFamily="18" charset="0"/>
+                          </a:rPr>
+                          <m:t> </m:t>
+                        </m:r>
+                        <m:r>
+                          <a:rPr lang="en-US" sz="1800" b="0" i="1" smtClean="0">
+                            <a:latin typeface="Cambria Math" panose="02040503050406030204" pitchFamily="18" charset="0"/>
+                          </a:rPr>
+                          <m:t>𝑏𝑦</m:t>
+                        </m:r>
+                        <m:r>
+                          <a:rPr lang="en-US" sz="1800" b="0" i="1" smtClean="0">
+                            <a:latin typeface="Cambria Math" panose="02040503050406030204" pitchFamily="18" charset="0"/>
+                          </a:rPr>
+                          <m:t> </m:t>
+                        </m:r>
+                        <m:r>
+                          <a:rPr lang="en-US" sz="1800" b="0" i="1" smtClean="0">
+                            <a:latin typeface="Cambria Math" panose="02040503050406030204" pitchFamily="18" charset="0"/>
+                          </a:rPr>
+                          <m:t>𝑖</m:t>
+                        </m:r>
+                      </m:num>
+                      <m:den>
+                        <m:r>
+                          <a:rPr lang="en-US" sz="1800" b="0" i="1" smtClean="0">
+                            <a:latin typeface="Cambria Math" panose="02040503050406030204" pitchFamily="18" charset="0"/>
+                          </a:rPr>
+                          <m:t>𝑛𝑢𝑚𝑏𝑒𝑟</m:t>
+                        </m:r>
+                        <m:r>
+                          <a:rPr lang="en-US" sz="1800" b="0" i="1" smtClean="0">
+                            <a:latin typeface="Cambria Math" panose="02040503050406030204" pitchFamily="18" charset="0"/>
+                          </a:rPr>
+                          <m:t> </m:t>
+                        </m:r>
+                        <m:r>
+                          <a:rPr lang="en-US" sz="1800" b="0" i="1" smtClean="0">
+                            <a:latin typeface="Cambria Math" panose="02040503050406030204" pitchFamily="18" charset="0"/>
+                          </a:rPr>
+                          <m:t>𝑜𝑓</m:t>
+                        </m:r>
+                        <m:r>
+                          <a:rPr lang="en-US" sz="1800" b="0" i="1" smtClean="0">
+                            <a:latin typeface="Cambria Math" panose="02040503050406030204" pitchFamily="18" charset="0"/>
+                          </a:rPr>
+                          <m:t> </m:t>
+                        </m:r>
+                        <m:r>
+                          <a:rPr lang="en-US" sz="1800" b="0" i="1" smtClean="0">
+                            <a:latin typeface="Cambria Math" panose="02040503050406030204" pitchFamily="18" charset="0"/>
+                          </a:rPr>
+                          <m:t>𝑒𝑔𝑔𝑠</m:t>
+                        </m:r>
+                        <m:r>
+                          <a:rPr lang="en-US" sz="1800" b="0" i="1" smtClean="0">
+                            <a:latin typeface="Cambria Math" panose="02040503050406030204" pitchFamily="18" charset="0"/>
+                          </a:rPr>
+                          <m:t> </m:t>
+                        </m:r>
+                        <m:r>
+                          <a:rPr lang="en-US" sz="1800" b="0" i="1" smtClean="0">
+                            <a:latin typeface="Cambria Math" panose="02040503050406030204" pitchFamily="18" charset="0"/>
+                          </a:rPr>
+                          <m:t>𝑙𝑎𝑖𝑑</m:t>
+                        </m:r>
+                        <m:r>
+                          <a:rPr lang="en-US" sz="1800" b="0" i="1" smtClean="0">
+                            <a:latin typeface="Cambria Math" panose="02040503050406030204" pitchFamily="18" charset="0"/>
+                          </a:rPr>
+                          <m:t> </m:t>
+                        </m:r>
+                        <m:r>
+                          <a:rPr lang="en-US" sz="1800" b="0" i="1" smtClean="0">
+                            <a:latin typeface="Cambria Math" panose="02040503050406030204" pitchFamily="18" charset="0"/>
+                          </a:rPr>
+                          <m:t>𝑏𝑦</m:t>
+                        </m:r>
+                        <m:r>
+                          <a:rPr lang="en-US" sz="1800" b="0" i="1" smtClean="0">
+                            <a:latin typeface="Cambria Math" panose="02040503050406030204" pitchFamily="18" charset="0"/>
+                          </a:rPr>
+                          <m:t> </m:t>
+                        </m:r>
+                        <m:r>
+                          <a:rPr lang="en-US" sz="1800" b="0" i="1" smtClean="0">
+                            <a:latin typeface="Cambria Math" panose="02040503050406030204" pitchFamily="18" charset="0"/>
+                          </a:rPr>
+                          <m:t>𝑎𝑙𝑙</m:t>
+                        </m:r>
+                        <m:r>
+                          <a:rPr lang="en-US" sz="1800" b="0" i="1" smtClean="0">
+                            <a:latin typeface="Cambria Math" panose="02040503050406030204" pitchFamily="18" charset="0"/>
+                          </a:rPr>
+                          <m:t> </m:t>
+                        </m:r>
+                        <m:r>
+                          <a:rPr lang="en-US" sz="1800" b="0" i="1" smtClean="0">
+                            <a:latin typeface="Cambria Math" panose="02040503050406030204" pitchFamily="18" charset="0"/>
+                          </a:rPr>
+                          <m:t>𝑐𝑢𝑐𝑘𝑜𝑜𝑠</m:t>
+                        </m:r>
+                      </m:den>
+                    </m:f>
+                    <m:r>
+                      <a:rPr lang="en-US" sz="1800" b="0" i="1" smtClean="0">
+                        <a:latin typeface="Cambria Math" panose="02040503050406030204" pitchFamily="18" charset="0"/>
+                      </a:rPr>
+                      <m:t>(</m:t>
+                    </m:r>
+                    <m:sSub>
+                      <m:sSubPr>
+                        <m:ctrlPr>
+                          <a:rPr lang="en-US" sz="1800" b="0" i="1" smtClean="0">
+                            <a:latin typeface="Cambria Math" panose="02040503050406030204" pitchFamily="18" charset="0"/>
+                          </a:rPr>
+                        </m:ctrlPr>
+                      </m:sSubPr>
+                      <m:e>
+                        <m:r>
+                          <a:rPr lang="en-US" sz="1800" b="0" i="1" smtClean="0">
+                            <a:latin typeface="Cambria Math" panose="02040503050406030204" pitchFamily="18" charset="0"/>
+                          </a:rPr>
+                          <m:t>𝑣𝑎𝑟</m:t>
+                        </m:r>
+                      </m:e>
+                      <m:sub>
+                        <m:r>
+                          <a:rPr lang="en-US" sz="1800" b="0" i="1" smtClean="0">
+                            <a:latin typeface="Cambria Math" panose="02040503050406030204" pitchFamily="18" charset="0"/>
+                          </a:rPr>
+                          <m:t>h𝑖</m:t>
+                        </m:r>
+                      </m:sub>
+                    </m:sSub>
+                    <m:r>
+                      <a:rPr lang="en-US" sz="1800" b="0" i="1" smtClean="0">
+                        <a:latin typeface="Cambria Math" panose="02040503050406030204" pitchFamily="18" charset="0"/>
+                      </a:rPr>
+                      <m:t>−</m:t>
+                    </m:r>
+                    <m:sSub>
+                      <m:sSubPr>
+                        <m:ctrlPr>
+                          <a:rPr lang="en-US" sz="1800" b="0" i="1" smtClean="0">
+                            <a:latin typeface="Cambria Math" panose="02040503050406030204" pitchFamily="18" charset="0"/>
+                          </a:rPr>
+                        </m:ctrlPr>
+                      </m:sSubPr>
+                      <m:e>
+                        <m:r>
+                          <a:rPr lang="en-US" sz="1800" b="0" i="1" smtClean="0">
+                            <a:latin typeface="Cambria Math" panose="02040503050406030204" pitchFamily="18" charset="0"/>
+                          </a:rPr>
+                          <m:t>𝑣𝑎𝑟</m:t>
+                        </m:r>
+                      </m:e>
+                      <m:sub>
+                        <m:r>
+                          <a:rPr lang="en-US" sz="1800" b="0" i="1" smtClean="0">
+                            <a:latin typeface="Cambria Math" panose="02040503050406030204" pitchFamily="18" charset="0"/>
+                          </a:rPr>
+                          <m:t>𝑙𝑜</m:t>
+                        </m:r>
+                      </m:sub>
+                    </m:sSub>
+                    <m:r>
+                      <a:rPr lang="en-US" sz="1800" b="0" i="1" smtClean="0">
+                        <a:latin typeface="Cambria Math" panose="02040503050406030204" pitchFamily="18" charset="0"/>
+                      </a:rPr>
+                      <m:t>)</m:t>
+                    </m:r>
+                  </m:oMath>
+                </a14:m>
+                <a:endParaRPr lang="en-US" sz="1800" dirty="0"/>
+              </a:p>
+              <a:p>
+                <a:r>
+                  <a:rPr lang="en-US" sz="2000" dirty="0"/>
+                  <a:t>A fraction </a:t>
+                </a:r>
+                <a14:m>
+                  <m:oMath xmlns:m="http://schemas.openxmlformats.org/officeDocument/2006/math">
+                    <m:r>
+                      <a:rPr lang="en-US" sz="2000" b="0" i="1" smtClean="0">
+                        <a:latin typeface="Cambria Math" panose="02040503050406030204" pitchFamily="18" charset="0"/>
+                      </a:rPr>
+                      <m:t>𝑝</m:t>
+                    </m:r>
+                    <m:r>
+                      <a:rPr lang="en-US" sz="2000" b="0" i="1" smtClean="0">
+                        <a:latin typeface="Cambria Math" panose="02040503050406030204" pitchFamily="18" charset="0"/>
+                      </a:rPr>
+                      <m:t>∈[0, 1]</m:t>
+                    </m:r>
+                  </m:oMath>
+                </a14:m>
+                <a:r>
+                  <a:rPr lang="en-US" sz="2000" dirty="0"/>
+                  <a:t> of the worst eggs are killed before hatching</a:t>
+                </a:r>
+              </a:p>
+              <a:p>
+                <a:r>
+                  <a:rPr lang="en-US" sz="2000" dirty="0"/>
+                  <a:t>Once hatched, the surviving eggs are added to the population of cuckoos</a:t>
+                </a:r>
+              </a:p>
+              <a:p>
+                <a:pPr lvl="1"/>
+                <a:r>
+                  <a:rPr lang="en-US" sz="1800" dirty="0"/>
+                  <a:t>If new </a:t>
+                </a:r>
+                <a14:m>
+                  <m:oMath xmlns:m="http://schemas.openxmlformats.org/officeDocument/2006/math">
+                    <m:sSub>
+                      <m:sSubPr>
+                        <m:ctrlPr>
+                          <a:rPr lang="en-US" sz="1800" i="1" smtClean="0">
+                            <a:latin typeface="Cambria Math" panose="02040503050406030204" pitchFamily="18" charset="0"/>
+                          </a:rPr>
+                        </m:ctrlPr>
+                      </m:sSubPr>
+                      <m:e>
+                        <m:r>
+                          <a:rPr lang="en-US" sz="1800" b="0" i="1" smtClean="0">
+                            <a:latin typeface="Cambria Math" panose="02040503050406030204" pitchFamily="18" charset="0"/>
+                          </a:rPr>
+                          <m:t>𝑁</m:t>
+                        </m:r>
+                      </m:e>
+                      <m:sub>
+                        <m:r>
+                          <a:rPr lang="en-US" sz="1800" b="0" i="1" smtClean="0">
+                            <a:latin typeface="Cambria Math" panose="02040503050406030204" pitchFamily="18" charset="0"/>
+                          </a:rPr>
+                          <m:t>𝑝𝑜𝑝</m:t>
+                        </m:r>
+                      </m:sub>
+                    </m:sSub>
+                    <m:r>
+                      <a:rPr lang="en-US" sz="1800" b="0" i="1" smtClean="0">
+                        <a:latin typeface="Cambria Math" panose="02040503050406030204" pitchFamily="18" charset="0"/>
+                      </a:rPr>
+                      <m:t>&gt;</m:t>
+                    </m:r>
+                    <m:sSub>
+                      <m:sSubPr>
+                        <m:ctrlPr>
+                          <a:rPr lang="en-US" sz="1800" b="0" i="1" smtClean="0">
+                            <a:latin typeface="Cambria Math" panose="02040503050406030204" pitchFamily="18" charset="0"/>
+                          </a:rPr>
+                        </m:ctrlPr>
+                      </m:sSubPr>
+                      <m:e>
+                        <m:r>
+                          <a:rPr lang="en-US" sz="1800" b="0" i="1" smtClean="0">
+                            <a:latin typeface="Cambria Math" panose="02040503050406030204" pitchFamily="18" charset="0"/>
+                          </a:rPr>
+                          <m:t>𝑁</m:t>
+                        </m:r>
+                      </m:e>
+                      <m:sub>
+                        <m:r>
+                          <a:rPr lang="en-US" sz="1800" b="0" i="1" smtClean="0">
+                            <a:latin typeface="Cambria Math" panose="02040503050406030204" pitchFamily="18" charset="0"/>
+                          </a:rPr>
+                          <m:t>𝑚𝑎𝑥</m:t>
+                        </m:r>
+                      </m:sub>
+                    </m:sSub>
+                  </m:oMath>
+                </a14:m>
+                <a:r>
+                  <a:rPr lang="en-US" sz="1800" dirty="0"/>
+                  <a:t>, the worst cuckoos are killed until </a:t>
+                </a:r>
+                <a14:m>
+                  <m:oMath xmlns:m="http://schemas.openxmlformats.org/officeDocument/2006/math">
+                    <m:sSub>
+                      <m:sSubPr>
+                        <m:ctrlPr>
+                          <a:rPr lang="en-US" sz="1800" i="1">
+                            <a:latin typeface="Cambria Math" panose="02040503050406030204" pitchFamily="18" charset="0"/>
+                          </a:rPr>
+                        </m:ctrlPr>
+                      </m:sSubPr>
+                      <m:e>
+                        <m:r>
+                          <a:rPr lang="en-US" sz="1800" i="1">
+                            <a:latin typeface="Cambria Math" panose="02040503050406030204" pitchFamily="18" charset="0"/>
+                          </a:rPr>
+                          <m:t>𝑁</m:t>
+                        </m:r>
+                      </m:e>
+                      <m:sub>
+                        <m:r>
+                          <a:rPr lang="en-US" sz="1800" i="1">
+                            <a:latin typeface="Cambria Math" panose="02040503050406030204" pitchFamily="18" charset="0"/>
+                          </a:rPr>
+                          <m:t>𝑝𝑜𝑝</m:t>
+                        </m:r>
+                      </m:sub>
+                    </m:sSub>
+                    <m:r>
+                      <a:rPr lang="en-US" sz="1800" b="0" i="1" smtClean="0">
+                        <a:latin typeface="Cambria Math" panose="02040503050406030204" pitchFamily="18" charset="0"/>
+                      </a:rPr>
+                      <m:t>=</m:t>
+                    </m:r>
+                    <m:sSub>
+                      <m:sSubPr>
+                        <m:ctrlPr>
+                          <a:rPr lang="en-US" sz="1800" i="1">
+                            <a:latin typeface="Cambria Math" panose="02040503050406030204" pitchFamily="18" charset="0"/>
+                          </a:rPr>
+                        </m:ctrlPr>
+                      </m:sSubPr>
+                      <m:e>
+                        <m:r>
+                          <a:rPr lang="en-US" sz="1800" i="1">
+                            <a:latin typeface="Cambria Math" panose="02040503050406030204" pitchFamily="18" charset="0"/>
+                          </a:rPr>
+                          <m:t>𝑁</m:t>
+                        </m:r>
+                      </m:e>
+                      <m:sub>
+                        <m:r>
+                          <a:rPr lang="en-US" sz="1800" i="1">
+                            <a:latin typeface="Cambria Math" panose="02040503050406030204" pitchFamily="18" charset="0"/>
+                          </a:rPr>
+                          <m:t>𝑚𝑎𝑥</m:t>
+                        </m:r>
+                      </m:sub>
+                    </m:sSub>
+                  </m:oMath>
+                </a14:m>
+                <a:endParaRPr lang="en-US" sz="1800" dirty="0"/>
+              </a:p>
+            </p:txBody>
+          </p:sp>
+        </mc:Choice>
+        <mc:Fallback>
+          <p:sp>
+            <p:nvSpPr>
+              <p:cNvPr id="3" name="Content Placeholder 2">
+                <a:extLst>
+                  <a:ext uri="{FF2B5EF4-FFF2-40B4-BE49-F238E27FC236}">
+                    <a16:creationId xmlns:a16="http://schemas.microsoft.com/office/drawing/2014/main" id="{18ED27A9-7C5A-4401-ACBD-37470CB7427E}"/>
+                  </a:ext>
+                </a:extLst>
+              </p:cNvPr>
+              <p:cNvSpPr>
+                <a:spLocks noGrp="1" noRot="1" noChangeAspect="1" noMove="1" noResize="1" noEditPoints="1" noAdjustHandles="1" noChangeArrowheads="1" noChangeShapeType="1" noTextEdit="1"/>
+              </p:cNvSpPr>
+              <p:nvPr>
+                <p:ph idx="1"/>
+              </p:nvPr>
+            </p:nvSpPr>
+            <p:spPr>
+              <a:xfrm>
+                <a:off x="1261872" y="1828800"/>
+                <a:ext cx="8595360" cy="4351337"/>
+              </a:xfrm>
+              <a:blipFill>
+                <a:blip r:embed="rId2"/>
+                <a:stretch>
+                  <a:fillRect l="-284" t="-980"/>
+                </a:stretch>
+              </a:blipFill>
+            </p:spPr>
+            <p:txBody>
+              <a:bodyPr/>
+              <a:lstStyle/>
+              <a:p>
+                <a:r>
+                  <a:rPr lang="en-US">
+                    <a:noFill/>
+                  </a:rPr>
+                  <a:t> </a:t>
+                </a:r>
+              </a:p>
+            </p:txBody>
+          </p:sp>
+        </mc:Fallback>
+      </mc:AlternateContent>
       <p:sp>
         <p:nvSpPr>
           <p:cNvPr id="15" name="Rectangle 9">

</xml_diff>

<commit_message>
began working on abbreviated slides
</commit_message>
<xml_diff>
--- a/Presentation_1.pptx
+++ b/Presentation_1.pptx
@@ -5,7 +5,7 @@
     <p:sldMasterId id="2147483857" r:id="rId1"/>
   </p:sldMasterIdLst>
   <p:notesMasterIdLst>
-    <p:notesMasterId r:id="rId22"/>
+    <p:notesMasterId r:id="rId24"/>
   </p:notesMasterIdLst>
   <p:sldIdLst>
     <p:sldId id="256" r:id="rId2"/>
@@ -28,6 +28,8 @@
     <p:sldId id="287" r:id="rId19"/>
     <p:sldId id="286" r:id="rId20"/>
     <p:sldId id="285" r:id="rId21"/>
+    <p:sldId id="289" r:id="rId22"/>
+    <p:sldId id="288" r:id="rId23"/>
   </p:sldIdLst>
   <p:sldSz cx="12192000" cy="6858000"/>
   <p:notesSz cx="6858000" cy="9144000"/>
@@ -151,6 +153,8 @@
             <p14:sldId id="287"/>
             <p14:sldId id="286"/>
             <p14:sldId id="285"/>
+            <p14:sldId id="289"/>
+            <p14:sldId id="288"/>
           </p14:sldIdLst>
         </p14:section>
       </p14:sectionLst>
@@ -244,7 +248,7 @@
           <a:p>
             <a:fld id="{776C8E78-E43C-423C-8F84-C588C40EE856}" type="datetimeFigureOut">
               <a:rPr lang="en-US" smtClean="0"/>
-              <a:t>24-Nov-20</a:t>
+              <a:t>16-Dec-20</a:t>
             </a:fld>
             <a:endParaRPr lang="en-US"/>
           </a:p>
@@ -763,6 +767,90 @@
 </p:notes>
 </file>
 
+<file path=ppt/notesSlides/notesSlide4.xml><?xml version="1.0" encoding="utf-8"?>
+<p:notes xmlns:a="http://schemas.openxmlformats.org/drawingml/2006/main" xmlns:r="http://schemas.openxmlformats.org/officeDocument/2006/relationships" xmlns:p="http://schemas.openxmlformats.org/presentationml/2006/main">
+  <p:cSld>
+    <p:spTree>
+      <p:nvGrpSpPr>
+        <p:cNvPr id="1" name=""/>
+        <p:cNvGrpSpPr/>
+        <p:nvPr/>
+      </p:nvGrpSpPr>
+      <p:grpSpPr>
+        <a:xfrm>
+          <a:off x="0" y="0"/>
+          <a:ext cx="0" cy="0"/>
+          <a:chOff x="0" y="0"/>
+          <a:chExt cx="0" cy="0"/>
+        </a:xfrm>
+      </p:grpSpPr>
+      <p:sp>
+        <p:nvSpPr>
+          <p:cNvPr id="2" name="Slide Image Placeholder 1"/>
+          <p:cNvSpPr>
+            <a:spLocks noGrp="1" noRot="1" noChangeAspect="1"/>
+          </p:cNvSpPr>
+          <p:nvPr>
+            <p:ph type="sldImg"/>
+          </p:nvPr>
+        </p:nvSpPr>
+        <p:spPr/>
+      </p:sp>
+      <p:sp>
+        <p:nvSpPr>
+          <p:cNvPr id="3" name="Notes Placeholder 2"/>
+          <p:cNvSpPr>
+            <a:spLocks noGrp="1"/>
+          </p:cNvSpPr>
+          <p:nvPr>
+            <p:ph type="body" idx="1"/>
+          </p:nvPr>
+        </p:nvSpPr>
+        <p:spPr/>
+        <p:txBody>
+          <a:bodyPr/>
+          <a:lstStyle/>
+          <a:p>
+            <a:endParaRPr lang="en-US" dirty="0"/>
+          </a:p>
+        </p:txBody>
+      </p:sp>
+      <p:sp>
+        <p:nvSpPr>
+          <p:cNvPr id="4" name="Slide Number Placeholder 3"/>
+          <p:cNvSpPr>
+            <a:spLocks noGrp="1"/>
+          </p:cNvSpPr>
+          <p:nvPr>
+            <p:ph type="sldNum" sz="quarter" idx="5"/>
+          </p:nvPr>
+        </p:nvSpPr>
+        <p:spPr/>
+        <p:txBody>
+          <a:bodyPr/>
+          <a:lstStyle/>
+          <a:p>
+            <a:fld id="{3BFE5297-BAB1-4F31-9AAE-8087F184D2A2}" type="slidenum">
+              <a:rPr lang="en-US" smtClean="0"/>
+              <a:t>21</a:t>
+            </a:fld>
+            <a:endParaRPr lang="en-US"/>
+          </a:p>
+        </p:txBody>
+      </p:sp>
+    </p:spTree>
+    <p:extLst>
+      <p:ext uri="{BB962C8B-B14F-4D97-AF65-F5344CB8AC3E}">
+        <p14:creationId xmlns:p14="http://schemas.microsoft.com/office/powerpoint/2010/main" val="3803000947"/>
+      </p:ext>
+    </p:extLst>
+  </p:cSld>
+  <p:clrMapOvr>
+    <a:masterClrMapping/>
+  </p:clrMapOvr>
+</p:notes>
+</file>
+
 <file path=ppt/slideLayouts/slideLayout1.xml><?xml version="1.0" encoding="utf-8"?>
 <p:sldLayout xmlns:a="http://schemas.openxmlformats.org/drawingml/2006/main" xmlns:r="http://schemas.openxmlformats.org/officeDocument/2006/relationships" xmlns:p="http://schemas.openxmlformats.org/presentationml/2006/main" showMasterSp="0" type="title" preserve="1">
   <p:cSld name="Title Slide">
@@ -931,7 +1019,7 @@
           <a:p>
             <a:fld id="{997E3D89-5AC1-4E29-8B79-6F7A6C159ABA}" type="datetimeFigureOut">
               <a:rPr lang="en-US" smtClean="0"/>
-              <a:t>24-Nov-20</a:t>
+              <a:t>16-Dec-20</a:t>
             </a:fld>
             <a:endParaRPr lang="en-US"/>
           </a:p>
@@ -1159,7 +1247,7 @@
           <a:p>
             <a:fld id="{997E3D89-5AC1-4E29-8B79-6F7A6C159ABA}" type="datetimeFigureOut">
               <a:rPr lang="en-US" smtClean="0"/>
-              <a:t>24-Nov-20</a:t>
+              <a:t>16-Dec-20</a:t>
             </a:fld>
             <a:endParaRPr lang="en-US"/>
           </a:p>
@@ -1339,7 +1427,7 @@
           <a:p>
             <a:fld id="{997E3D89-5AC1-4E29-8B79-6F7A6C159ABA}" type="datetimeFigureOut">
               <a:rPr lang="en-US" smtClean="0"/>
-              <a:t>24-Nov-20</a:t>
+              <a:t>16-Dec-20</a:t>
             </a:fld>
             <a:endParaRPr lang="en-US"/>
           </a:p>
@@ -1509,7 +1597,7 @@
           <a:p>
             <a:fld id="{997E3D89-5AC1-4E29-8B79-6F7A6C159ABA}" type="datetimeFigureOut">
               <a:rPr lang="en-US" smtClean="0"/>
-              <a:t>24-Nov-20</a:t>
+              <a:t>16-Dec-20</a:t>
             </a:fld>
             <a:endParaRPr lang="en-US"/>
           </a:p>
@@ -1763,7 +1851,7 @@
           <a:p>
             <a:fld id="{997E3D89-5AC1-4E29-8B79-6F7A6C159ABA}" type="datetimeFigureOut">
               <a:rPr lang="en-US" smtClean="0"/>
-              <a:t>24-Nov-20</a:t>
+              <a:t>16-Dec-20</a:t>
             </a:fld>
             <a:endParaRPr lang="en-US"/>
           </a:p>
@@ -2089,7 +2177,7 @@
           <a:p>
             <a:fld id="{997E3D89-5AC1-4E29-8B79-6F7A6C159ABA}" type="datetimeFigureOut">
               <a:rPr lang="en-US" smtClean="0"/>
-              <a:t>24-Nov-20</a:t>
+              <a:t>16-Dec-20</a:t>
             </a:fld>
             <a:endParaRPr lang="en-US"/>
           </a:p>
@@ -2540,7 +2628,7 @@
           <a:p>
             <a:fld id="{997E3D89-5AC1-4E29-8B79-6F7A6C159ABA}" type="datetimeFigureOut">
               <a:rPr lang="en-US" smtClean="0"/>
-              <a:t>24-Nov-20</a:t>
+              <a:t>16-Dec-20</a:t>
             </a:fld>
             <a:endParaRPr lang="en-US"/>
           </a:p>
@@ -2658,7 +2746,7 @@
           <a:p>
             <a:fld id="{997E3D89-5AC1-4E29-8B79-6F7A6C159ABA}" type="datetimeFigureOut">
               <a:rPr lang="en-US" smtClean="0"/>
-              <a:t>24-Nov-20</a:t>
+              <a:t>16-Dec-20</a:t>
             </a:fld>
             <a:endParaRPr lang="en-US"/>
           </a:p>
@@ -2753,7 +2841,7 @@
           <a:p>
             <a:fld id="{997E3D89-5AC1-4E29-8B79-6F7A6C159ABA}" type="datetimeFigureOut">
               <a:rPr lang="en-US" smtClean="0"/>
-              <a:t>24-Nov-20</a:t>
+              <a:t>16-Dec-20</a:t>
             </a:fld>
             <a:endParaRPr lang="en-US"/>
           </a:p>
@@ -3040,7 +3128,7 @@
           <a:p>
             <a:fld id="{997E3D89-5AC1-4E29-8B79-6F7A6C159ABA}" type="datetimeFigureOut">
               <a:rPr lang="en-US" smtClean="0"/>
-              <a:t>24-Nov-20</a:t>
+              <a:t>16-Dec-20</a:t>
             </a:fld>
             <a:endParaRPr lang="en-US"/>
           </a:p>
@@ -3362,7 +3450,7 @@
           <a:p>
             <a:fld id="{997E3D89-5AC1-4E29-8B79-6F7A6C159ABA}" type="datetimeFigureOut">
               <a:rPr lang="en-US" smtClean="0"/>
-              <a:t>24-Nov-20</a:t>
+              <a:t>16-Dec-20</a:t>
             </a:fld>
             <a:endParaRPr lang="en-US"/>
           </a:p>
@@ -3616,7 +3704,7 @@
           <a:p>
             <a:fld id="{997E3D89-5AC1-4E29-8B79-6F7A6C159ABA}" type="datetimeFigureOut">
               <a:rPr lang="en-US" smtClean="0"/>
-              <a:t>24-Nov-20</a:t>
+              <a:t>16-Dec-20</a:t>
             </a:fld>
             <a:endParaRPr lang="en-US"/>
           </a:p>
@@ -4268,8 +4356,8 @@
           </a:p>
         </p:txBody>
       </p:sp>
-      <mc:AlternateContent xmlns:mc="http://schemas.openxmlformats.org/markup-compatibility/2006">
-        <mc:Choice xmlns:a14="http://schemas.microsoft.com/office/drawing/2010/main" Requires="a14">
+      <mc:AlternateContent xmlns:mc="http://schemas.openxmlformats.org/markup-compatibility/2006" xmlns:a14="http://schemas.microsoft.com/office/drawing/2010/main">
+        <mc:Choice Requires="a14">
           <p:sp>
             <p:nvSpPr>
               <p:cNvPr id="3" name="Content Placeholder 2">
@@ -4799,7 +4887,7 @@
             </p:txBody>
           </p:sp>
         </mc:Choice>
-        <mc:Fallback>
+        <mc:Fallback xmlns="">
           <p:sp>
             <p:nvSpPr>
               <p:cNvPr id="3" name="Content Placeholder 2">
@@ -11004,8 +11092,8 @@
           </a:p>
         </p:txBody>
       </p:sp>
-      <mc:AlternateContent xmlns:mc="http://schemas.openxmlformats.org/markup-compatibility/2006">
-        <mc:Choice xmlns:a14="http://schemas.microsoft.com/office/drawing/2010/main" Requires="a14">
+      <mc:AlternateContent xmlns:mc="http://schemas.openxmlformats.org/markup-compatibility/2006" xmlns:a14="http://schemas.microsoft.com/office/drawing/2010/main">
+        <mc:Choice Requires="a14">
           <p:sp>
             <p:nvSpPr>
               <p:cNvPr id="3" name="Content Placeholder 2">
@@ -11264,7 +11352,7 @@
             </p:txBody>
           </p:sp>
         </mc:Choice>
-        <mc:Fallback>
+        <mc:Fallback xmlns="">
           <p:sp>
             <p:nvSpPr>
               <p:cNvPr id="3" name="Content Placeholder 2">
@@ -11597,6 +11685,1148 @@
     <p:extLst>
       <p:ext uri="{BB962C8B-B14F-4D97-AF65-F5344CB8AC3E}">
         <p14:creationId xmlns:p14="http://schemas.microsoft.com/office/powerpoint/2010/main" val="4370994"/>
+      </p:ext>
+    </p:extLst>
+  </p:cSld>
+  <p:clrMapOvr>
+    <a:overrideClrMapping bg1="dk1" tx1="lt1" bg2="dk2" tx2="lt2" accent1="accent1" accent2="accent2" accent3="accent3" accent4="accent4" accent5="accent5" accent6="accent6" hlink="hlink" folHlink="folHlink"/>
+  </p:clrMapOvr>
+</p:sld>
+</file>
+
+<file path=ppt/slides/slide21.xml><?xml version="1.0" encoding="utf-8"?>
+<p:sld xmlns:a="http://schemas.openxmlformats.org/drawingml/2006/main" xmlns:r="http://schemas.openxmlformats.org/officeDocument/2006/relationships" xmlns:p="http://schemas.openxmlformats.org/presentationml/2006/main">
+  <p:cSld>
+    <p:bg>
+      <p:bgPr>
+        <a:solidFill>
+          <a:schemeClr val="bg2">
+            <a:lumMod val="75000"/>
+          </a:schemeClr>
+        </a:solidFill>
+        <a:effectLst/>
+      </p:bgPr>
+    </p:bg>
+    <p:spTree>
+      <p:nvGrpSpPr>
+        <p:cNvPr id="1" name=""/>
+        <p:cNvGrpSpPr/>
+        <p:nvPr/>
+      </p:nvGrpSpPr>
+      <p:grpSpPr>
+        <a:xfrm>
+          <a:off x="0" y="0"/>
+          <a:ext cx="0" cy="0"/>
+          <a:chOff x="0" y="0"/>
+          <a:chExt cx="0" cy="0"/>
+        </a:xfrm>
+      </p:grpSpPr>
+      <p:sp>
+        <p:nvSpPr>
+          <p:cNvPr id="10" name="Rectangle 9">
+            <a:extLst>
+              <a:ext uri="{FF2B5EF4-FFF2-40B4-BE49-F238E27FC236}">
+                <a16:creationId xmlns:a16="http://schemas.microsoft.com/office/drawing/2014/main" id="{5D5E0904-721C-4D68-9EB8-1C9752E329A7}"/>
+              </a:ext>
+              <a:ext uri="{C183D7F6-B498-43B3-948B-1728B52AA6E4}">
+                <adec:decorative xmlns:adec="http://schemas.microsoft.com/office/drawing/2017/decorative" val="1"/>
+              </a:ext>
+            </a:extLst>
+          </p:cNvPr>
+          <p:cNvSpPr>
+            <a:spLocks noGrp="1" noRot="1" noChangeAspect="1" noMove="1" noResize="1" noEditPoints="1" noAdjustHandles="1" noChangeArrowheads="1" noChangeShapeType="1" noTextEdit="1"/>
+          </p:cNvSpPr>
+          <p:nvPr>
+            <p:extLst>
+              <p:ext uri="{386F3935-93C4-4BCD-93E2-E3B085C9AB24}">
+                <p16:designElem xmlns:p16="http://schemas.microsoft.com/office/powerpoint/2015/main" val="1"/>
+              </p:ext>
+            </p:extLst>
+          </p:nvPr>
+        </p:nvSpPr>
+        <p:spPr>
+          <a:xfrm>
+            <a:off x="0" y="0"/>
+            <a:ext cx="457200" cy="6858000"/>
+          </a:xfrm>
+          <a:prstGeom prst="rect">
+            <a:avLst/>
+          </a:prstGeom>
+          <a:solidFill>
+            <a:schemeClr val="accent1"/>
+          </a:solidFill>
+          <a:ln>
+            <a:noFill/>
+          </a:ln>
+        </p:spPr>
+        <p:style>
+          <a:lnRef idx="2">
+            <a:schemeClr val="accent1">
+              <a:shade val="50000"/>
+            </a:schemeClr>
+          </a:lnRef>
+          <a:fillRef idx="1">
+            <a:schemeClr val="accent1"/>
+          </a:fillRef>
+          <a:effectRef idx="0">
+            <a:schemeClr val="accent1"/>
+          </a:effectRef>
+          <a:fontRef idx="minor">
+            <a:schemeClr val="lt1"/>
+          </a:fontRef>
+        </p:style>
+      </p:sp>
+      <p:sp>
+        <p:nvSpPr>
+          <p:cNvPr id="2" name="Title 1">
+            <a:extLst>
+              <a:ext uri="{FF2B5EF4-FFF2-40B4-BE49-F238E27FC236}">
+                <a16:creationId xmlns:a16="http://schemas.microsoft.com/office/drawing/2014/main" id="{F9B195F7-C8F2-4AEE-838F-FFBF62F056BD}"/>
+              </a:ext>
+            </a:extLst>
+          </p:cNvPr>
+          <p:cNvSpPr>
+            <a:spLocks noGrp="1"/>
+          </p:cNvSpPr>
+          <p:nvPr>
+            <p:ph type="title"/>
+          </p:nvPr>
+        </p:nvSpPr>
+        <p:spPr>
+          <a:xfrm>
+            <a:off x="1502664" y="2060684"/>
+            <a:ext cx="9186671" cy="2736631"/>
+          </a:xfrm>
+        </p:spPr>
+        <p:txBody>
+          <a:bodyPr vert="horz" lIns="91440" tIns="45720" rIns="91440" bIns="45720" rtlCol="0" anchor="b">
+            <a:normAutofit/>
+          </a:bodyPr>
+          <a:lstStyle/>
+          <a:p>
+            <a:pPr>
+              <a:lnSpc>
+                <a:spcPct val="85000"/>
+              </a:lnSpc>
+            </a:pPr>
+            <a:r>
+              <a:rPr lang="en-US" sz="7200" dirty="0"/>
+              <a:t>CS/ACO Hybrid for Graph Colouring</a:t>
+            </a:r>
+          </a:p>
+        </p:txBody>
+      </p:sp>
+    </p:spTree>
+    <p:extLst>
+      <p:ext uri="{BB962C8B-B14F-4D97-AF65-F5344CB8AC3E}">
+        <p14:creationId xmlns:p14="http://schemas.microsoft.com/office/powerpoint/2010/main" val="2194199896"/>
+      </p:ext>
+    </p:extLst>
+  </p:cSld>
+  <p:clrMapOvr>
+    <a:masterClrMapping/>
+  </p:clrMapOvr>
+</p:sld>
+</file>
+
+<file path=ppt/slides/slide22.xml><?xml version="1.0" encoding="utf-8"?>
+<p:sld xmlns:a="http://schemas.openxmlformats.org/drawingml/2006/main" xmlns:r="http://schemas.openxmlformats.org/officeDocument/2006/relationships" xmlns:p="http://schemas.openxmlformats.org/presentationml/2006/main">
+  <p:cSld>
+    <p:bg>
+      <p:bgPr>
+        <a:solidFill>
+          <a:schemeClr val="bg1">
+            <a:tint val="95000"/>
+            <a:satMod val="170000"/>
+          </a:schemeClr>
+        </a:solidFill>
+        <a:effectLst/>
+      </p:bgPr>
+    </p:bg>
+    <p:spTree>
+      <p:nvGrpSpPr>
+        <p:cNvPr id="1" name=""/>
+        <p:cNvGrpSpPr/>
+        <p:nvPr/>
+      </p:nvGrpSpPr>
+      <p:grpSpPr>
+        <a:xfrm>
+          <a:off x="0" y="0"/>
+          <a:ext cx="0" cy="0"/>
+          <a:chOff x="0" y="0"/>
+          <a:chExt cx="0" cy="0"/>
+        </a:xfrm>
+      </p:grpSpPr>
+      <p:sp useBgFill="1">
+        <p:nvSpPr>
+          <p:cNvPr id="14" name="Rectangle 7">
+            <a:extLst>
+              <a:ext uri="{FF2B5EF4-FFF2-40B4-BE49-F238E27FC236}">
+                <a16:creationId xmlns:a16="http://schemas.microsoft.com/office/drawing/2014/main" id="{5DB0431E-0B04-44A1-9C51-531E28D18A60}"/>
+              </a:ext>
+              <a:ext uri="{C183D7F6-B498-43B3-948B-1728B52AA6E4}">
+                <adec:decorative xmlns:adec="http://schemas.microsoft.com/office/drawing/2017/decorative" val="1"/>
+              </a:ext>
+            </a:extLst>
+          </p:cNvPr>
+          <p:cNvSpPr>
+            <a:spLocks noGrp="1" noRot="1" noChangeAspect="1" noMove="1" noResize="1" noEditPoints="1" noAdjustHandles="1" noChangeArrowheads="1" noChangeShapeType="1" noTextEdit="1"/>
+          </p:cNvSpPr>
+          <p:nvPr>
+            <p:extLst>
+              <p:ext uri="{386F3935-93C4-4BCD-93E2-E3B085C9AB24}">
+                <p16:designElem xmlns:p16="http://schemas.microsoft.com/office/powerpoint/2015/main" val="1"/>
+              </p:ext>
+            </p:extLst>
+          </p:nvPr>
+        </p:nvSpPr>
+        <p:spPr>
+          <a:xfrm>
+            <a:off x="0" y="0"/>
+            <a:ext cx="12192000" cy="6858000"/>
+          </a:xfrm>
+          <a:prstGeom prst="rect">
+            <a:avLst/>
+          </a:prstGeom>
+          <a:ln>
+            <a:noFill/>
+          </a:ln>
+        </p:spPr>
+        <p:style>
+          <a:lnRef idx="2">
+            <a:schemeClr val="accent1">
+              <a:shade val="50000"/>
+            </a:schemeClr>
+          </a:lnRef>
+          <a:fillRef idx="1">
+            <a:schemeClr val="accent1"/>
+          </a:fillRef>
+          <a:effectRef idx="0">
+            <a:schemeClr val="accent1"/>
+          </a:effectRef>
+          <a:fontRef idx="minor">
+            <a:schemeClr val="lt1"/>
+          </a:fontRef>
+        </p:style>
+        <p:txBody>
+          <a:bodyPr rtlCol="0" anchor="ctr"/>
+          <a:lstStyle/>
+          <a:p>
+            <a:pPr algn="ctr"/>
+            <a:endParaRPr lang="en-US"/>
+          </a:p>
+        </p:txBody>
+      </p:sp>
+      <p:sp>
+        <p:nvSpPr>
+          <p:cNvPr id="2" name="Title 1">
+            <a:extLst>
+              <a:ext uri="{FF2B5EF4-FFF2-40B4-BE49-F238E27FC236}">
+                <a16:creationId xmlns:a16="http://schemas.microsoft.com/office/drawing/2014/main" id="{565DE6B2-5AC6-4C70-9F08-2A6D960838A3}"/>
+              </a:ext>
+            </a:extLst>
+          </p:cNvPr>
+          <p:cNvSpPr>
+            <a:spLocks noGrp="1"/>
+          </p:cNvSpPr>
+          <p:nvPr>
+            <p:ph type="title"/>
+          </p:nvPr>
+        </p:nvSpPr>
+        <p:spPr>
+          <a:xfrm>
+            <a:off x="1261872" y="365760"/>
+            <a:ext cx="9692640" cy="1325562"/>
+          </a:xfrm>
+        </p:spPr>
+        <p:txBody>
+          <a:bodyPr>
+            <a:normAutofit/>
+          </a:bodyPr>
+          <a:lstStyle/>
+          <a:p>
+            <a:r>
+              <a:rPr lang="en-US" dirty="0"/>
+              <a:t>A Hybrid Discretisation of Lévy Flights</a:t>
+            </a:r>
+          </a:p>
+        </p:txBody>
+      </p:sp>
+      <mc:AlternateContent xmlns:mc="http://schemas.openxmlformats.org/markup-compatibility/2006">
+        <mc:Choice xmlns:a14="http://schemas.microsoft.com/office/drawing/2010/main" Requires="a14">
+          <p:sp>
+            <p:nvSpPr>
+              <p:cNvPr id="3" name="Content Placeholder 2">
+                <a:extLst>
+                  <a:ext uri="{FF2B5EF4-FFF2-40B4-BE49-F238E27FC236}">
+                    <a16:creationId xmlns:a16="http://schemas.microsoft.com/office/drawing/2014/main" id="{18ED27A9-7C5A-4401-ACBD-37470CB7427E}"/>
+                  </a:ext>
+                </a:extLst>
+              </p:cNvPr>
+              <p:cNvSpPr>
+                <a:spLocks noGrp="1"/>
+              </p:cNvSpPr>
+              <p:nvPr>
+                <p:ph idx="1"/>
+              </p:nvPr>
+            </p:nvSpPr>
+            <p:spPr>
+              <a:xfrm>
+                <a:off x="1261872" y="1828800"/>
+                <a:ext cx="8595360" cy="4351337"/>
+              </a:xfrm>
+            </p:spPr>
+            <p:txBody>
+              <a:bodyPr>
+                <a:normAutofit lnSpcReduction="10000"/>
+              </a:bodyPr>
+              <a:lstStyle/>
+              <a:p>
+                <a:r>
+                  <a:rPr lang="en-US" sz="2000" dirty="0"/>
+                  <a:t>Produce a weighted Pheromone Graph </a:t>
+                </a:r>
+                <a14:m>
+                  <m:oMath xmlns:m="http://schemas.openxmlformats.org/officeDocument/2006/math">
+                    <m:r>
+                      <a:rPr lang="en-US" sz="2000" b="0" i="1" smtClean="0">
+                        <a:latin typeface="Cambria Math" panose="02040503050406030204" pitchFamily="18" charset="0"/>
+                      </a:rPr>
+                      <m:t>𝜏</m:t>
+                    </m:r>
+                  </m:oMath>
+                </a14:m>
+                <a:endParaRPr lang="en-US" sz="2000" dirty="0"/>
+              </a:p>
+              <a:p>
+                <a:pPr lvl="1"/>
+                <a:r>
+                  <a:rPr lang="en-US" sz="1800" dirty="0"/>
+                  <a:t>Initially, </a:t>
+                </a:r>
+                <a14:m>
+                  <m:oMath xmlns:m="http://schemas.openxmlformats.org/officeDocument/2006/math">
+                    <m:sSub>
+                      <m:sSubPr>
+                        <m:ctrlPr>
+                          <a:rPr lang="en-US" sz="1800" i="1" smtClean="0">
+                            <a:latin typeface="Cambria Math" panose="02040503050406030204" pitchFamily="18" charset="0"/>
+                          </a:rPr>
+                        </m:ctrlPr>
+                      </m:sSubPr>
+                      <m:e>
+                        <m:r>
+                          <a:rPr lang="en-US" sz="1800" b="0" i="1" smtClean="0">
+                            <a:latin typeface="Cambria Math" panose="02040503050406030204" pitchFamily="18" charset="0"/>
+                          </a:rPr>
+                          <m:t>𝜏</m:t>
+                        </m:r>
+                      </m:e>
+                      <m:sub>
+                        <m:r>
+                          <a:rPr lang="en-US" sz="1800" b="0" i="1" smtClean="0">
+                            <a:latin typeface="Cambria Math" panose="02040503050406030204" pitchFamily="18" charset="0"/>
+                          </a:rPr>
+                          <m:t>𝑢𝑣</m:t>
+                        </m:r>
+                      </m:sub>
+                    </m:sSub>
+                    <m:r>
+                      <a:rPr lang="en-US" sz="1800" b="0" i="1" smtClean="0">
+                        <a:latin typeface="Cambria Math" panose="02040503050406030204" pitchFamily="18" charset="0"/>
+                      </a:rPr>
+                      <m:t>=0</m:t>
+                    </m:r>
+                  </m:oMath>
+                </a14:m>
+                <a:r>
+                  <a:rPr lang="en-US" sz="1800" dirty="0"/>
+                  <a:t> if u and v are adjacent in G, 1 otherwise</a:t>
+                </a:r>
+              </a:p>
+              <a:p>
+                <a:r>
+                  <a:rPr lang="en-US" sz="2000" dirty="0"/>
+                  <a:t>To perform a Lévy flight, begin at the vertex v with highest degree</a:t>
+                </a:r>
+              </a:p>
+              <a:p>
+                <a:pPr lvl="1"/>
+                <a:r>
+                  <a:rPr lang="en-US" sz="1800" dirty="0"/>
+                  <a:t>For </a:t>
+                </a:r>
+                <a:r>
+                  <a:rPr lang="en-US" sz="1800" dirty="0" err="1"/>
+                  <a:t>i</a:t>
+                </a:r>
+                <a:r>
+                  <a:rPr lang="en-US" sz="1800" dirty="0"/>
+                  <a:t> = 1, …, M (where M is drawn from a Lévy distribution):</a:t>
+                </a:r>
+              </a:p>
+              <a:p>
+                <a:pPr lvl="2"/>
+                <a:r>
+                  <a:rPr lang="en-US" sz="1600" dirty="0"/>
+                  <a:t>Select u from among non-tabu vertices with probability </a:t>
+                </a:r>
+                <a14:m>
+                  <m:oMath xmlns:m="http://schemas.openxmlformats.org/officeDocument/2006/math">
+                    <m:f>
+                      <m:fPr>
+                        <m:ctrlPr>
+                          <a:rPr lang="en-US" sz="1600" i="1" smtClean="0">
+                            <a:latin typeface="Cambria Math" panose="02040503050406030204" pitchFamily="18" charset="0"/>
+                          </a:rPr>
+                        </m:ctrlPr>
+                      </m:fPr>
+                      <m:num>
+                        <m:sSubSup>
+                          <m:sSubSupPr>
+                            <m:ctrlPr>
+                              <a:rPr lang="en-US" sz="1600" i="1" smtClean="0">
+                                <a:latin typeface="Cambria Math" panose="02040503050406030204" pitchFamily="18" charset="0"/>
+                              </a:rPr>
+                            </m:ctrlPr>
+                          </m:sSubSupPr>
+                          <m:e>
+                            <m:r>
+                              <a:rPr lang="en-US" sz="1600" b="0" i="1" smtClean="0">
+                                <a:latin typeface="Cambria Math" panose="02040503050406030204" pitchFamily="18" charset="0"/>
+                              </a:rPr>
+                              <m:t>𝜏</m:t>
+                            </m:r>
+                          </m:e>
+                          <m:sub>
+                            <m:r>
+                              <a:rPr lang="en-US" sz="1600" b="0" i="1" smtClean="0">
+                                <a:latin typeface="Cambria Math" panose="02040503050406030204" pitchFamily="18" charset="0"/>
+                              </a:rPr>
+                              <m:t>𝑣𝑢</m:t>
+                            </m:r>
+                          </m:sub>
+                          <m:sup>
+                            <m:r>
+                              <a:rPr lang="en-US" sz="1600" b="0" i="1" smtClean="0">
+                                <a:latin typeface="Cambria Math" panose="02040503050406030204" pitchFamily="18" charset="0"/>
+                              </a:rPr>
+                              <m:t>𝛾</m:t>
+                            </m:r>
+                          </m:sup>
+                        </m:sSubSup>
+                        <m:sSubSup>
+                          <m:sSubSupPr>
+                            <m:ctrlPr>
+                              <a:rPr lang="en-US" sz="1600" i="1" smtClean="0">
+                                <a:latin typeface="Cambria Math" panose="02040503050406030204" pitchFamily="18" charset="0"/>
+                              </a:rPr>
+                            </m:ctrlPr>
+                          </m:sSubSupPr>
+                          <m:e>
+                            <m:r>
+                              <a:rPr lang="en-US" sz="1600" b="0" i="1" smtClean="0">
+                                <a:latin typeface="Cambria Math" panose="02040503050406030204" pitchFamily="18" charset="0"/>
+                              </a:rPr>
+                              <m:t>𝜂</m:t>
+                            </m:r>
+                          </m:e>
+                          <m:sub>
+                            <m:r>
+                              <a:rPr lang="en-US" sz="1600" b="0" i="1" smtClean="0">
+                                <a:latin typeface="Cambria Math" panose="02040503050406030204" pitchFamily="18" charset="0"/>
+                              </a:rPr>
+                              <m:t>𝑣𝑢</m:t>
+                            </m:r>
+                          </m:sub>
+                          <m:sup>
+                            <m:r>
+                              <a:rPr lang="en-US" sz="1600" b="0" i="1" smtClean="0">
+                                <a:latin typeface="Cambria Math" panose="02040503050406030204" pitchFamily="18" charset="0"/>
+                              </a:rPr>
+                              <m:t>𝛿</m:t>
+                            </m:r>
+                          </m:sup>
+                        </m:sSubSup>
+                      </m:num>
+                      <m:den>
+                        <m:nary>
+                          <m:naryPr>
+                            <m:chr m:val="∑"/>
+                            <m:supHide m:val="on"/>
+                            <m:ctrlPr>
+                              <a:rPr lang="en-US" sz="1600" i="1" smtClean="0">
+                                <a:latin typeface="Cambria Math" panose="02040503050406030204" pitchFamily="18" charset="0"/>
+                              </a:rPr>
+                            </m:ctrlPr>
+                          </m:naryPr>
+                          <m:sub>
+                            <m:r>
+                              <m:rPr>
+                                <m:brk m:alnAt="7"/>
+                              </m:rPr>
+                              <a:rPr lang="en-US" sz="1600" b="0" i="1" smtClean="0">
+                                <a:latin typeface="Cambria Math" panose="02040503050406030204" pitchFamily="18" charset="0"/>
+                              </a:rPr>
+                              <m:t>𝑥</m:t>
+                            </m:r>
+                            <m:r>
+                              <a:rPr lang="en-US" sz="1600" b="0" i="1" smtClean="0">
+                                <a:latin typeface="Cambria Math" panose="02040503050406030204" pitchFamily="18" charset="0"/>
+                              </a:rPr>
+                              <m:t>∉</m:t>
+                            </m:r>
+                            <m:r>
+                              <a:rPr lang="en-US" sz="1600" b="0" i="1" smtClean="0">
+                                <a:latin typeface="Cambria Math" panose="02040503050406030204" pitchFamily="18" charset="0"/>
+                              </a:rPr>
+                              <m:t>𝑇𝑎𝑏𝑢</m:t>
+                            </m:r>
+                          </m:sub>
+                          <m:sup/>
+                          <m:e>
+                            <m:sSubSup>
+                              <m:sSubSupPr>
+                                <m:ctrlPr>
+                                  <a:rPr lang="en-US" sz="1600" i="1">
+                                    <a:latin typeface="Cambria Math" panose="02040503050406030204" pitchFamily="18" charset="0"/>
+                                  </a:rPr>
+                                </m:ctrlPr>
+                              </m:sSubSupPr>
+                              <m:e>
+                                <m:r>
+                                  <a:rPr lang="en-US" sz="1600" i="1">
+                                    <a:latin typeface="Cambria Math" panose="02040503050406030204" pitchFamily="18" charset="0"/>
+                                  </a:rPr>
+                                  <m:t>𝜏</m:t>
+                                </m:r>
+                              </m:e>
+                              <m:sub>
+                                <m:r>
+                                  <a:rPr lang="en-US" sz="1600" i="1">
+                                    <a:latin typeface="Cambria Math" panose="02040503050406030204" pitchFamily="18" charset="0"/>
+                                  </a:rPr>
+                                  <m:t>𝑣</m:t>
+                                </m:r>
+                                <m:r>
+                                  <a:rPr lang="en-US" sz="1600" b="0" i="1" smtClean="0">
+                                    <a:latin typeface="Cambria Math" panose="02040503050406030204" pitchFamily="18" charset="0"/>
+                                  </a:rPr>
+                                  <m:t>𝑥</m:t>
+                                </m:r>
+                              </m:sub>
+                              <m:sup>
+                                <m:r>
+                                  <a:rPr lang="en-US" sz="1600" i="1">
+                                    <a:latin typeface="Cambria Math" panose="02040503050406030204" pitchFamily="18" charset="0"/>
+                                  </a:rPr>
+                                  <m:t>𝛾</m:t>
+                                </m:r>
+                              </m:sup>
+                            </m:sSubSup>
+                            <m:sSubSup>
+                              <m:sSubSupPr>
+                                <m:ctrlPr>
+                                  <a:rPr lang="en-US" sz="1600" i="1">
+                                    <a:latin typeface="Cambria Math" panose="02040503050406030204" pitchFamily="18" charset="0"/>
+                                  </a:rPr>
+                                </m:ctrlPr>
+                              </m:sSubSupPr>
+                              <m:e>
+                                <m:r>
+                                  <a:rPr lang="en-US" sz="1600" i="1">
+                                    <a:latin typeface="Cambria Math" panose="02040503050406030204" pitchFamily="18" charset="0"/>
+                                  </a:rPr>
+                                  <m:t>𝜂</m:t>
+                                </m:r>
+                              </m:e>
+                              <m:sub>
+                                <m:r>
+                                  <a:rPr lang="en-US" sz="1600" i="1">
+                                    <a:latin typeface="Cambria Math" panose="02040503050406030204" pitchFamily="18" charset="0"/>
+                                  </a:rPr>
+                                  <m:t>𝑣</m:t>
+                                </m:r>
+                                <m:r>
+                                  <a:rPr lang="en-US" sz="1600" b="0" i="1" smtClean="0">
+                                    <a:latin typeface="Cambria Math" panose="02040503050406030204" pitchFamily="18" charset="0"/>
+                                  </a:rPr>
+                                  <m:t>𝑥</m:t>
+                                </m:r>
+                              </m:sub>
+                              <m:sup>
+                                <m:r>
+                                  <a:rPr lang="en-US" sz="1600" i="1">
+                                    <a:latin typeface="Cambria Math" panose="02040503050406030204" pitchFamily="18" charset="0"/>
+                                  </a:rPr>
+                                  <m:t>𝛿</m:t>
+                                </m:r>
+                              </m:sup>
+                            </m:sSubSup>
+                          </m:e>
+                        </m:nary>
+                      </m:den>
+                    </m:f>
+                  </m:oMath>
+                </a14:m>
+                <a:endParaRPr lang="en-US" sz="1600" dirty="0"/>
+              </a:p>
+              <a:p>
+                <a:pPr lvl="2"/>
+                <a:r>
+                  <a:rPr lang="en-US" sz="1600" dirty="0"/>
+                  <a:t>Recolour u to colour causing fewest conflicts</a:t>
+                </a:r>
+              </a:p>
+              <a:p>
+                <a:pPr lvl="1"/>
+                <a:r>
+                  <a:rPr lang="en-US" sz="1800" dirty="0"/>
+                  <a:t>For each edge </a:t>
+                </a:r>
+                <a:r>
+                  <a:rPr lang="en-US" sz="1800" dirty="0" err="1"/>
+                  <a:t>xy</a:t>
+                </a:r>
+                <a:r>
+                  <a:rPr lang="en-US" sz="1800" dirty="0"/>
+                  <a:t> in the path through </a:t>
+                </a:r>
+                <a14:m>
+                  <m:oMath xmlns:m="http://schemas.openxmlformats.org/officeDocument/2006/math">
+                    <m:r>
+                      <a:rPr lang="en-US" sz="1800" b="0" i="1" smtClean="0">
+                        <a:latin typeface="Cambria Math" panose="02040503050406030204" pitchFamily="18" charset="0"/>
+                      </a:rPr>
+                      <m:t>𝜏</m:t>
+                    </m:r>
+                  </m:oMath>
+                </a14:m>
+                <a:r>
+                  <a:rPr lang="en-US" sz="1800" dirty="0"/>
+                  <a:t> generated in the above steps, let </a:t>
+                </a:r>
+                <a14:m>
+                  <m:oMath xmlns:m="http://schemas.openxmlformats.org/officeDocument/2006/math">
+                    <m:r>
+                      <m:rPr>
+                        <m:sty m:val="p"/>
+                      </m:rPr>
+                      <a:rPr lang="en-US" sz="1800" b="0" i="0" smtClean="0">
+                        <a:latin typeface="Cambria Math" panose="02040503050406030204" pitchFamily="18" charset="0"/>
+                      </a:rPr>
+                      <m:t>Δ</m:t>
+                    </m:r>
+                    <m:sSub>
+                      <m:sSubPr>
+                        <m:ctrlPr>
+                          <a:rPr lang="en-US" sz="1800" b="0" i="1" smtClean="0">
+                            <a:latin typeface="Cambria Math" panose="02040503050406030204" pitchFamily="18" charset="0"/>
+                          </a:rPr>
+                        </m:ctrlPr>
+                      </m:sSubPr>
+                      <m:e>
+                        <m:r>
+                          <a:rPr lang="en-US" sz="1800" b="0" i="1" smtClean="0">
+                            <a:latin typeface="Cambria Math" panose="02040503050406030204" pitchFamily="18" charset="0"/>
+                          </a:rPr>
+                          <m:t>𝜏</m:t>
+                        </m:r>
+                      </m:e>
+                      <m:sub>
+                        <m:r>
+                          <a:rPr lang="en-US" sz="1800" b="0" i="1" smtClean="0">
+                            <a:latin typeface="Cambria Math" panose="02040503050406030204" pitchFamily="18" charset="0"/>
+                          </a:rPr>
+                          <m:t>𝑥𝑦</m:t>
+                        </m:r>
+                      </m:sub>
+                    </m:sSub>
+                    <m:r>
+                      <a:rPr lang="en-US" sz="1800" b="0" i="1" smtClean="0">
+                        <a:latin typeface="Cambria Math" panose="02040503050406030204" pitchFamily="18" charset="0"/>
+                      </a:rPr>
+                      <m:t>=1−</m:t>
+                    </m:r>
+                    <m:r>
+                      <a:rPr lang="en-US" sz="1800" b="0" i="1" smtClean="0">
+                        <a:latin typeface="Cambria Math" panose="02040503050406030204" pitchFamily="18" charset="0"/>
+                      </a:rPr>
+                      <m:t>𝜎</m:t>
+                    </m:r>
+                    <m:r>
+                      <a:rPr lang="en-US" sz="1800" b="0" i="1" smtClean="0">
+                        <a:latin typeface="Cambria Math" panose="02040503050406030204" pitchFamily="18" charset="0"/>
+                      </a:rPr>
+                      <m:t>(</m:t>
+                    </m:r>
+                    <m:r>
+                      <a:rPr lang="en-US" sz="1800" b="0" i="1" smtClean="0">
+                        <a:latin typeface="Cambria Math" panose="02040503050406030204" pitchFamily="18" charset="0"/>
+                      </a:rPr>
+                      <m:t>𝑓</m:t>
+                    </m:r>
+                    <m:r>
+                      <a:rPr lang="en-US" sz="1800" b="0" i="1" smtClean="0">
+                        <a:latin typeface="Cambria Math" panose="02040503050406030204" pitchFamily="18" charset="0"/>
+                      </a:rPr>
+                      <m:t>)</m:t>
+                    </m:r>
+                  </m:oMath>
+                </a14:m>
+                <a:r>
+                  <a:rPr lang="en-US" sz="1800" dirty="0"/>
+                  <a:t> where f is the fitness of the colouring generated above</a:t>
+                </a:r>
+              </a:p>
+              <a:p>
+                <a:r>
+                  <a:rPr lang="en-US" sz="2000" dirty="0"/>
+                  <a:t>Once a Lévy flight has been performed for every nest, update </a:t>
+                </a:r>
+                <a14:m>
+                  <m:oMath xmlns:m="http://schemas.openxmlformats.org/officeDocument/2006/math">
+                    <m:r>
+                      <a:rPr lang="en-US" sz="2000" b="0" i="1" smtClean="0">
+                        <a:latin typeface="Cambria Math" panose="02040503050406030204" pitchFamily="18" charset="0"/>
+                      </a:rPr>
+                      <m:t>𝜏</m:t>
+                    </m:r>
+                  </m:oMath>
+                </a14:m>
+                <a:r>
+                  <a:rPr lang="en-US" sz="2000" dirty="0"/>
+                  <a:t> like so:</a:t>
+                </a:r>
+              </a:p>
+              <a:p>
+                <a:pPr lvl="1"/>
+                <a:r>
+                  <a:rPr lang="en-US" sz="1800" dirty="0"/>
+                  <a:t>If </a:t>
+                </a:r>
+                <a:r>
+                  <a:rPr lang="en-US" sz="1800" dirty="0" err="1"/>
+                  <a:t>uv</a:t>
+                </a:r>
+                <a:r>
+                  <a:rPr lang="en-US" sz="1800" dirty="0"/>
+                  <a:t> was traversed by the best nest in the current generation: </a:t>
+                </a:r>
+                <a14:m>
+                  <m:oMath xmlns:m="http://schemas.openxmlformats.org/officeDocument/2006/math">
+                    <m:sSub>
+                      <m:sSubPr>
+                        <m:ctrlPr>
+                          <a:rPr lang="en-US" sz="1800" i="1" smtClean="0">
+                            <a:latin typeface="Cambria Math" panose="02040503050406030204" pitchFamily="18" charset="0"/>
+                          </a:rPr>
+                        </m:ctrlPr>
+                      </m:sSubPr>
+                      <m:e>
+                        <m:r>
+                          <a:rPr lang="en-US" sz="1800" b="0" i="1" smtClean="0">
+                            <a:latin typeface="Cambria Math" panose="02040503050406030204" pitchFamily="18" charset="0"/>
+                          </a:rPr>
+                          <m:t>𝜏</m:t>
+                        </m:r>
+                      </m:e>
+                      <m:sub>
+                        <m:r>
+                          <a:rPr lang="en-US" sz="1800" b="0" i="1" smtClean="0">
+                            <a:latin typeface="Cambria Math" panose="02040503050406030204" pitchFamily="18" charset="0"/>
+                          </a:rPr>
+                          <m:t>𝑢𝑣</m:t>
+                        </m:r>
+                      </m:sub>
+                    </m:sSub>
+                    <m:r>
+                      <a:rPr lang="en-US" sz="1800" b="0" i="1" smtClean="0">
+                        <a:latin typeface="Cambria Math" panose="02040503050406030204" pitchFamily="18" charset="0"/>
+                      </a:rPr>
+                      <m:t>=</m:t>
+                    </m:r>
+                    <m:d>
+                      <m:dPr>
+                        <m:ctrlPr>
+                          <a:rPr lang="en-US" sz="1800" b="0" i="1" smtClean="0">
+                            <a:latin typeface="Cambria Math" panose="02040503050406030204" pitchFamily="18" charset="0"/>
+                          </a:rPr>
+                        </m:ctrlPr>
+                      </m:dPr>
+                      <m:e>
+                        <m:r>
+                          <a:rPr lang="en-US" sz="1800" b="0" i="1" smtClean="0">
+                            <a:latin typeface="Cambria Math" panose="02040503050406030204" pitchFamily="18" charset="0"/>
+                          </a:rPr>
+                          <m:t>1−</m:t>
+                        </m:r>
+                        <m:r>
+                          <a:rPr lang="en-US" sz="1800" b="0" i="1" smtClean="0">
+                            <a:latin typeface="Cambria Math" panose="02040503050406030204" pitchFamily="18" charset="0"/>
+                          </a:rPr>
+                          <m:t>𝜌</m:t>
+                        </m:r>
+                      </m:e>
+                    </m:d>
+                    <m:sSub>
+                      <m:sSubPr>
+                        <m:ctrlPr>
+                          <a:rPr lang="en-US" sz="1800" b="0" i="1" smtClean="0">
+                            <a:latin typeface="Cambria Math" panose="02040503050406030204" pitchFamily="18" charset="0"/>
+                          </a:rPr>
+                        </m:ctrlPr>
+                      </m:sSubPr>
+                      <m:e>
+                        <m:r>
+                          <a:rPr lang="en-US" sz="1800" b="0" i="1" smtClean="0">
+                            <a:latin typeface="Cambria Math" panose="02040503050406030204" pitchFamily="18" charset="0"/>
+                          </a:rPr>
+                          <m:t>𝜏</m:t>
+                        </m:r>
+                      </m:e>
+                      <m:sub>
+                        <m:r>
+                          <a:rPr lang="en-US" sz="1800" b="0" i="1" smtClean="0">
+                            <a:latin typeface="Cambria Math" panose="02040503050406030204" pitchFamily="18" charset="0"/>
+                          </a:rPr>
+                          <m:t>𝑢𝑣</m:t>
+                        </m:r>
+                      </m:sub>
+                    </m:sSub>
+                    <m:r>
+                      <a:rPr lang="en-US" sz="1800" b="0" i="1" smtClean="0">
+                        <a:latin typeface="Cambria Math" panose="02040503050406030204" pitchFamily="18" charset="0"/>
+                      </a:rPr>
+                      <m:t>+</m:t>
+                    </m:r>
+                    <m:r>
+                      <m:rPr>
+                        <m:sty m:val="p"/>
+                      </m:rPr>
+                      <a:rPr lang="en-US" sz="1800" b="0" i="0" smtClean="0">
+                        <a:latin typeface="Cambria Math" panose="02040503050406030204" pitchFamily="18" charset="0"/>
+                      </a:rPr>
+                      <m:t>Δ</m:t>
+                    </m:r>
+                    <m:sSub>
+                      <m:sSubPr>
+                        <m:ctrlPr>
+                          <a:rPr lang="en-US" sz="1800" b="0" i="1" smtClean="0">
+                            <a:latin typeface="Cambria Math" panose="02040503050406030204" pitchFamily="18" charset="0"/>
+                          </a:rPr>
+                        </m:ctrlPr>
+                      </m:sSubPr>
+                      <m:e>
+                        <m:r>
+                          <a:rPr lang="en-US" sz="1800" b="0" i="1" smtClean="0">
+                            <a:latin typeface="Cambria Math" panose="02040503050406030204" pitchFamily="18" charset="0"/>
+                          </a:rPr>
+                          <m:t>𝜏</m:t>
+                        </m:r>
+                      </m:e>
+                      <m:sub>
+                        <m:r>
+                          <a:rPr lang="en-US" sz="1800" b="0" i="1" smtClean="0">
+                            <a:latin typeface="Cambria Math" panose="02040503050406030204" pitchFamily="18" charset="0"/>
+                          </a:rPr>
+                          <m:t>𝑢𝑣</m:t>
+                        </m:r>
+                      </m:sub>
+                    </m:sSub>
+                    <m:r>
+                      <a:rPr lang="en-US" sz="1800" b="0" i="1" smtClean="0">
+                        <a:latin typeface="Cambria Math" panose="02040503050406030204" pitchFamily="18" charset="0"/>
+                      </a:rPr>
+                      <m:t>+</m:t>
+                    </m:r>
+                    <m:r>
+                      <a:rPr lang="en-US" sz="1800" b="0" i="1" smtClean="0">
+                        <a:latin typeface="Cambria Math" panose="02040503050406030204" pitchFamily="18" charset="0"/>
+                      </a:rPr>
+                      <m:t>𝑤</m:t>
+                    </m:r>
+                    <m:r>
+                      <a:rPr lang="en-US" sz="1800" b="0" i="1" smtClean="0">
+                        <a:latin typeface="Cambria Math" panose="02040503050406030204" pitchFamily="18" charset="0"/>
+                      </a:rPr>
+                      <m:t>(1−</m:t>
+                    </m:r>
+                    <m:r>
+                      <a:rPr lang="en-US" sz="1800" b="0" i="1" smtClean="0">
+                        <a:latin typeface="Cambria Math" panose="02040503050406030204" pitchFamily="18" charset="0"/>
+                      </a:rPr>
+                      <m:t>𝜎</m:t>
+                    </m:r>
+                    <m:d>
+                      <m:dPr>
+                        <m:ctrlPr>
+                          <a:rPr lang="en-US" sz="1800" b="0" i="1" smtClean="0">
+                            <a:latin typeface="Cambria Math" panose="02040503050406030204" pitchFamily="18" charset="0"/>
+                          </a:rPr>
+                        </m:ctrlPr>
+                      </m:dPr>
+                      <m:e>
+                        <m:r>
+                          <a:rPr lang="en-US" sz="1800" b="0" i="1" smtClean="0">
+                            <a:latin typeface="Cambria Math" panose="02040503050406030204" pitchFamily="18" charset="0"/>
+                          </a:rPr>
+                          <m:t>𝑓</m:t>
+                        </m:r>
+                      </m:e>
+                    </m:d>
+                    <m:r>
+                      <a:rPr lang="en-US" sz="1800" b="0" i="1" smtClean="0">
+                        <a:latin typeface="Cambria Math" panose="02040503050406030204" pitchFamily="18" charset="0"/>
+                      </a:rPr>
+                      <m:t>)</m:t>
+                    </m:r>
+                  </m:oMath>
+                </a14:m>
+                <a:r>
+                  <a:rPr lang="en-US" sz="1800" dirty="0"/>
+                  <a:t> where f is the fitness of the best nest</a:t>
+                </a:r>
+              </a:p>
+              <a:p>
+                <a:pPr lvl="1"/>
+                <a:r>
+                  <a:rPr lang="en-US" sz="1800" dirty="0"/>
+                  <a:t>Otherwise: </a:t>
+                </a:r>
+                <a14:m>
+                  <m:oMath xmlns:m="http://schemas.openxmlformats.org/officeDocument/2006/math">
+                    <m:sSub>
+                      <m:sSubPr>
+                        <m:ctrlPr>
+                          <a:rPr lang="en-US" sz="1800" i="1" smtClean="0">
+                            <a:latin typeface="Cambria Math" panose="02040503050406030204" pitchFamily="18" charset="0"/>
+                          </a:rPr>
+                        </m:ctrlPr>
+                      </m:sSubPr>
+                      <m:e>
+                        <m:r>
+                          <a:rPr lang="en-US" sz="1800" b="0" i="1" smtClean="0">
+                            <a:latin typeface="Cambria Math" panose="02040503050406030204" pitchFamily="18" charset="0"/>
+                          </a:rPr>
+                          <m:t>𝜏</m:t>
+                        </m:r>
+                      </m:e>
+                      <m:sub>
+                        <m:r>
+                          <a:rPr lang="en-US" sz="1800" b="0" i="1" smtClean="0">
+                            <a:latin typeface="Cambria Math" panose="02040503050406030204" pitchFamily="18" charset="0"/>
+                          </a:rPr>
+                          <m:t>𝑢𝑣</m:t>
+                        </m:r>
+                      </m:sub>
+                    </m:sSub>
+                    <m:r>
+                      <a:rPr lang="en-US" sz="1800" b="0" i="1" smtClean="0">
+                        <a:latin typeface="Cambria Math" panose="02040503050406030204" pitchFamily="18" charset="0"/>
+                      </a:rPr>
+                      <m:t>=</m:t>
+                    </m:r>
+                    <m:d>
+                      <m:dPr>
+                        <m:ctrlPr>
+                          <a:rPr lang="en-US" sz="1800" b="0" i="1" smtClean="0">
+                            <a:latin typeface="Cambria Math" panose="02040503050406030204" pitchFamily="18" charset="0"/>
+                          </a:rPr>
+                        </m:ctrlPr>
+                      </m:dPr>
+                      <m:e>
+                        <m:r>
+                          <a:rPr lang="en-US" sz="1800" b="0" i="1" smtClean="0">
+                            <a:latin typeface="Cambria Math" panose="02040503050406030204" pitchFamily="18" charset="0"/>
+                          </a:rPr>
+                          <m:t>1−</m:t>
+                        </m:r>
+                        <m:r>
+                          <a:rPr lang="en-US" sz="1800" b="0" i="1" smtClean="0">
+                            <a:latin typeface="Cambria Math" panose="02040503050406030204" pitchFamily="18" charset="0"/>
+                          </a:rPr>
+                          <m:t>𝜌</m:t>
+                        </m:r>
+                      </m:e>
+                    </m:d>
+                    <m:sSub>
+                      <m:sSubPr>
+                        <m:ctrlPr>
+                          <a:rPr lang="en-US" sz="1800" b="0" i="1" smtClean="0">
+                            <a:latin typeface="Cambria Math" panose="02040503050406030204" pitchFamily="18" charset="0"/>
+                          </a:rPr>
+                        </m:ctrlPr>
+                      </m:sSubPr>
+                      <m:e>
+                        <m:r>
+                          <a:rPr lang="en-US" sz="1800" b="0" i="1" smtClean="0">
+                            <a:latin typeface="Cambria Math" panose="02040503050406030204" pitchFamily="18" charset="0"/>
+                          </a:rPr>
+                          <m:t>𝜏</m:t>
+                        </m:r>
+                      </m:e>
+                      <m:sub>
+                        <m:r>
+                          <a:rPr lang="en-US" sz="1800" b="0" i="1" smtClean="0">
+                            <a:latin typeface="Cambria Math" panose="02040503050406030204" pitchFamily="18" charset="0"/>
+                          </a:rPr>
+                          <m:t>𝑢𝑣</m:t>
+                        </m:r>
+                      </m:sub>
+                    </m:sSub>
+                    <m:r>
+                      <a:rPr lang="en-US" sz="1800" b="0" i="1" smtClean="0">
+                        <a:latin typeface="Cambria Math" panose="02040503050406030204" pitchFamily="18" charset="0"/>
+                      </a:rPr>
+                      <m:t>+</m:t>
+                    </m:r>
+                    <m:r>
+                      <m:rPr>
+                        <m:sty m:val="p"/>
+                      </m:rPr>
+                      <a:rPr lang="en-US" sz="1800" b="0" i="0" smtClean="0">
+                        <a:latin typeface="Cambria Math" panose="02040503050406030204" pitchFamily="18" charset="0"/>
+                      </a:rPr>
+                      <m:t>Δ</m:t>
+                    </m:r>
+                    <m:sSub>
+                      <m:sSubPr>
+                        <m:ctrlPr>
+                          <a:rPr lang="en-US" sz="1800" b="0" i="1" smtClean="0">
+                            <a:latin typeface="Cambria Math" panose="02040503050406030204" pitchFamily="18" charset="0"/>
+                          </a:rPr>
+                        </m:ctrlPr>
+                      </m:sSubPr>
+                      <m:e>
+                        <m:r>
+                          <a:rPr lang="en-US" sz="1800" b="0" i="1" smtClean="0">
+                            <a:latin typeface="Cambria Math" panose="02040503050406030204" pitchFamily="18" charset="0"/>
+                          </a:rPr>
+                          <m:t>𝜏</m:t>
+                        </m:r>
+                      </m:e>
+                      <m:sub>
+                        <m:r>
+                          <a:rPr lang="en-US" sz="1800" b="0" i="1" smtClean="0">
+                            <a:latin typeface="Cambria Math" panose="02040503050406030204" pitchFamily="18" charset="0"/>
+                          </a:rPr>
+                          <m:t>𝑢𝑣</m:t>
+                        </m:r>
+                      </m:sub>
+                    </m:sSub>
+                  </m:oMath>
+                </a14:m>
+                <a:endParaRPr lang="en-US" sz="1800" b="0" dirty="0"/>
+              </a:p>
+            </p:txBody>
+          </p:sp>
+        </mc:Choice>
+        <mc:Fallback>
+          <p:sp>
+            <p:nvSpPr>
+              <p:cNvPr id="3" name="Content Placeholder 2">
+                <a:extLst>
+                  <a:ext uri="{FF2B5EF4-FFF2-40B4-BE49-F238E27FC236}">
+                    <a16:creationId xmlns:a16="http://schemas.microsoft.com/office/drawing/2014/main" id="{18ED27A9-7C5A-4401-ACBD-37470CB7427E}"/>
+                  </a:ext>
+                </a:extLst>
+              </p:cNvPr>
+              <p:cNvSpPr>
+                <a:spLocks noGrp="1" noRot="1" noChangeAspect="1" noMove="1" noResize="1" noEditPoints="1" noAdjustHandles="1" noChangeArrowheads="1" noChangeShapeType="1" noTextEdit="1"/>
+              </p:cNvSpPr>
+              <p:nvPr>
+                <p:ph idx="1"/>
+              </p:nvPr>
+            </p:nvSpPr>
+            <p:spPr>
+              <a:xfrm>
+                <a:off x="1261872" y="1828800"/>
+                <a:ext cx="8595360" cy="4351337"/>
+              </a:xfrm>
+              <a:blipFill>
+                <a:blip r:embed="rId2"/>
+                <a:stretch>
+                  <a:fillRect l="-284" t="-1821"/>
+                </a:stretch>
+              </a:blipFill>
+            </p:spPr>
+            <p:txBody>
+              <a:bodyPr/>
+              <a:lstStyle/>
+              <a:p>
+                <a:r>
+                  <a:rPr lang="en-US">
+                    <a:noFill/>
+                  </a:rPr>
+                  <a:t> </a:t>
+                </a:r>
+              </a:p>
+            </p:txBody>
+          </p:sp>
+        </mc:Fallback>
+      </mc:AlternateContent>
+      <p:sp>
+        <p:nvSpPr>
+          <p:cNvPr id="15" name="Rectangle 9">
+            <a:extLst>
+              <a:ext uri="{FF2B5EF4-FFF2-40B4-BE49-F238E27FC236}">
+                <a16:creationId xmlns:a16="http://schemas.microsoft.com/office/drawing/2014/main" id="{6B424749-EEE0-49C9-9ABF-97B171A3EA00}"/>
+              </a:ext>
+              <a:ext uri="{C183D7F6-B498-43B3-948B-1728B52AA6E4}">
+                <adec:decorative xmlns:adec="http://schemas.microsoft.com/office/drawing/2017/decorative" val="1"/>
+              </a:ext>
+            </a:extLst>
+          </p:cNvPr>
+          <p:cNvSpPr>
+            <a:spLocks noGrp="1" noRot="1" noChangeAspect="1" noMove="1" noResize="1" noEditPoints="1" noAdjustHandles="1" noChangeArrowheads="1" noChangeShapeType="1" noTextEdit="1"/>
+          </p:cNvSpPr>
+          <p:nvPr>
+            <p:extLst>
+              <p:ext uri="{386F3935-93C4-4BCD-93E2-E3B085C9AB24}">
+                <p16:designElem xmlns:p16="http://schemas.microsoft.com/office/powerpoint/2015/main" val="1"/>
+              </p:ext>
+            </p:extLst>
+          </p:nvPr>
+        </p:nvSpPr>
+        <p:spPr>
+          <a:xfrm>
+            <a:off x="11277600" y="0"/>
+            <a:ext cx="914400" cy="6858000"/>
+          </a:xfrm>
+          <a:prstGeom prst="rect">
+            <a:avLst/>
+          </a:prstGeom>
+          <a:solidFill>
+            <a:schemeClr val="tx2">
+              <a:lumMod val="75000"/>
+            </a:schemeClr>
+          </a:solidFill>
+          <a:ln>
+            <a:noFill/>
+          </a:ln>
+        </p:spPr>
+        <p:style>
+          <a:lnRef idx="2">
+            <a:schemeClr val="accent1">
+              <a:shade val="50000"/>
+            </a:schemeClr>
+          </a:lnRef>
+          <a:fillRef idx="1">
+            <a:schemeClr val="accent1"/>
+          </a:fillRef>
+          <a:effectRef idx="0">
+            <a:schemeClr val="accent1"/>
+          </a:effectRef>
+          <a:fontRef idx="minor">
+            <a:schemeClr val="lt1"/>
+          </a:fontRef>
+        </p:style>
+      </p:sp>
+    </p:spTree>
+    <p:extLst>
+      <p:ext uri="{BB962C8B-B14F-4D97-AF65-F5344CB8AC3E}">
+        <p14:creationId xmlns:p14="http://schemas.microsoft.com/office/powerpoint/2010/main" val="4208033420"/>
       </p:ext>
     </p:extLst>
   </p:cSld>
@@ -13835,8 +15065,8 @@
           </a:p>
         </p:txBody>
       </p:sp>
-      <mc:AlternateContent xmlns:mc="http://schemas.openxmlformats.org/markup-compatibility/2006">
-        <mc:Choice xmlns:a14="http://schemas.microsoft.com/office/drawing/2010/main" Requires="a14">
+      <mc:AlternateContent xmlns:mc="http://schemas.openxmlformats.org/markup-compatibility/2006" xmlns:a14="http://schemas.microsoft.com/office/drawing/2010/main">
+        <mc:Choice Requires="a14">
           <p:sp>
             <p:nvSpPr>
               <p:cNvPr id="3" name="Content Placeholder 2">
@@ -14313,7 +15543,7 @@
             </p:txBody>
           </p:sp>
         </mc:Choice>
-        <mc:Fallback>
+        <mc:Fallback xmlns="">
           <p:sp>
             <p:nvSpPr>
               <p:cNvPr id="3" name="Content Placeholder 2">

</xml_diff>